<commit_message>
- Week 2 content
</commit_message>
<xml_diff>
--- a/lectures/week2/lecture2/slides/week2_lecture2.pptx
+++ b/lectures/week2/lecture2/slides/week2_lecture2.pptx
@@ -2,7 +2,7 @@
 <file path=ppt/presentation.xml><?xml version="1.0" encoding="utf-8"?>
 <p:presentation xmlns:a="http://schemas.openxmlformats.org/drawingml/2006/main" xmlns:r="http://schemas.openxmlformats.org/officeDocument/2006/relationships" xmlns:p="http://schemas.openxmlformats.org/presentationml/2006/main" saveSubsetFonts="1">
   <p:sldMasterIdLst>
-    <p:sldMasterId id="2147483665" r:id="rId1"/>
+    <p:sldMasterId id="2147483670" r:id="rId1"/>
   </p:sldMasterIdLst>
   <p:sldIdLst>
     <p:sldId id="256" r:id="rId2"/>
@@ -215,7 +215,7 @@
           <p:cNvPr id="2" name="Title 1">
             <a:extLst>
               <a:ext uri="{FF2B5EF4-FFF2-40B4-BE49-F238E27FC236}">
-                <a16:creationId xmlns:a16="http://schemas.microsoft.com/office/drawing/2014/main" id="{8C70E9A4-6E61-4AF5-9711-A3D313611356}"/>
+                <a16:creationId xmlns:a16="http://schemas.microsoft.com/office/drawing/2014/main" id="{45F8F638-606D-A22E-8F9F-A4A6D858EDA6}"/>
               </a:ext>
             </a:extLst>
           </p:cNvPr>
@@ -228,17 +228,15 @@
         </p:nvSpPr>
         <p:spPr>
           <a:xfrm>
-            <a:off x="335947" y="2409479"/>
+            <a:off x="335947" y="3285779"/>
             <a:ext cx="11391065" cy="893580"/>
           </a:xfrm>
         </p:spPr>
         <p:txBody>
-          <a:bodyPr anchor="b">
-            <a:normAutofit/>
-          </a:bodyPr>
+          <a:bodyPr/>
           <a:lstStyle>
-            <a:lvl1pPr algn="l">
-              <a:defRPr sz="4800">
+            <a:lvl1pPr>
+              <a:defRPr>
                 <a:solidFill>
                   <a:srgbClr val="FFFFFF"/>
                 </a:solidFill>
@@ -250,7 +248,7 @@
               <a:rPr lang="en-US"/>
               <a:t>Click to edit Master title style</a:t>
             </a:r>
-            <a:endParaRPr lang="en-CA" dirty="0"/>
+            <a:endParaRPr lang="en-US" dirty="0"/>
           </a:p>
         </p:txBody>
       </p:sp>
@@ -259,7 +257,7 @@
           <p:cNvPr id="3" name="Subtitle 2">
             <a:extLst>
               <a:ext uri="{FF2B5EF4-FFF2-40B4-BE49-F238E27FC236}">
-                <a16:creationId xmlns:a16="http://schemas.microsoft.com/office/drawing/2014/main" id="{959B255B-D275-45F6-ACB5-BBD491BB4ADD}"/>
+                <a16:creationId xmlns:a16="http://schemas.microsoft.com/office/drawing/2014/main" id="{4EB4BAB1-A261-2102-CEA9-063F697A42AF}"/>
               </a:ext>
             </a:extLst>
           </p:cNvPr>
@@ -272,70 +270,35 @@
         </p:nvSpPr>
         <p:spPr>
           <a:xfrm>
-            <a:off x="335947" y="3848999"/>
+            <a:off x="335947" y="4553849"/>
             <a:ext cx="11391065" cy="1655762"/>
           </a:xfrm>
-          <a:prstGeom prst="rect">
-            <a:avLst/>
-          </a:prstGeom>
         </p:spPr>
         <p:txBody>
           <a:bodyPr/>
           <a:lstStyle>
-            <a:lvl1pPr marL="0" indent="0" algn="l">
+            <a:lvl1pPr marL="0" indent="0">
               <a:buNone/>
-              <a:defRPr sz="2400">
+              <a:defRPr>
                 <a:solidFill>
                   <a:srgbClr val="FFFFFF"/>
                 </a:solidFill>
               </a:defRPr>
             </a:lvl1pPr>
-            <a:lvl2pPr marL="457200" indent="0" algn="ctr">
-              <a:buNone/>
-              <a:defRPr sz="2000"/>
-            </a:lvl2pPr>
-            <a:lvl3pPr marL="914400" indent="0" algn="ctr">
-              <a:buNone/>
-              <a:defRPr sz="1800"/>
-            </a:lvl3pPr>
-            <a:lvl4pPr marL="1371600" indent="0" algn="ctr">
-              <a:buNone/>
-              <a:defRPr sz="1600"/>
-            </a:lvl4pPr>
-            <a:lvl5pPr marL="1828800" indent="0" algn="ctr">
-              <a:buNone/>
-              <a:defRPr sz="1600"/>
-            </a:lvl5pPr>
-            <a:lvl6pPr marL="2286000" indent="0" algn="ctr">
-              <a:buNone/>
-              <a:defRPr sz="1600"/>
-            </a:lvl6pPr>
-            <a:lvl7pPr marL="2743200" indent="0" algn="ctr">
-              <a:buNone/>
-              <a:defRPr sz="1600"/>
-            </a:lvl7pPr>
-            <a:lvl8pPr marL="3200400" indent="0" algn="ctr">
-              <a:buNone/>
-              <a:defRPr sz="1600"/>
-            </a:lvl8pPr>
-            <a:lvl9pPr marL="3657600" indent="0" algn="ctr">
-              <a:buNone/>
-              <a:defRPr sz="1600"/>
-            </a:lvl9pPr>
           </a:lstStyle>
           <a:p>
             <a:r>
               <a:rPr lang="en-US"/>
               <a:t>Click to edit Master subtitle style</a:t>
             </a:r>
-            <a:endParaRPr lang="en-CA"/>
+            <a:endParaRPr lang="en-US" dirty="0"/>
           </a:p>
         </p:txBody>
       </p:sp>
     </p:spTree>
     <p:extLst>
       <p:ext uri="{BB962C8B-B14F-4D97-AF65-F5344CB8AC3E}">
-        <p14:creationId xmlns:p14="http://schemas.microsoft.com/office/powerpoint/2010/main" val="3250989464"/>
+        <p14:creationId xmlns:p14="http://schemas.microsoft.com/office/powerpoint/2010/main" val="3662678402"/>
       </p:ext>
     </p:extLst>
   </p:cSld>
@@ -442,6 +405,9 @@
           <a:bodyPr/>
           <a:lstStyle>
             <a:lvl1pPr>
+              <a:buClr>
+                <a:schemeClr val="accent2"/>
+              </a:buClr>
               <a:defRPr>
                 <a:solidFill>
                   <a:srgbClr val="444445"/>
@@ -449,6 +415,9 @@
               </a:defRPr>
             </a:lvl1pPr>
             <a:lvl2pPr>
+              <a:buClr>
+                <a:schemeClr val="accent2"/>
+              </a:buClr>
               <a:defRPr>
                 <a:solidFill>
                   <a:srgbClr val="444445"/>
@@ -456,6 +425,9 @@
               </a:defRPr>
             </a:lvl2pPr>
             <a:lvl3pPr>
+              <a:buClr>
+                <a:schemeClr val="accent2"/>
+              </a:buClr>
               <a:defRPr>
                 <a:solidFill>
                   <a:srgbClr val="444445"/>
@@ -463,6 +435,9 @@
               </a:defRPr>
             </a:lvl3pPr>
             <a:lvl4pPr>
+              <a:buClr>
+                <a:schemeClr val="accent2"/>
+              </a:buClr>
               <a:defRPr>
                 <a:solidFill>
                   <a:srgbClr val="444445"/>
@@ -470,6 +445,9 @@
               </a:defRPr>
             </a:lvl4pPr>
             <a:lvl5pPr>
+              <a:buClr>
+                <a:schemeClr val="accent2"/>
+              </a:buClr>
               <a:defRPr>
                 <a:solidFill>
                   <a:srgbClr val="444445"/>
@@ -481,7 +459,7 @@
             <a:pPr lvl="0"/>
             <a:r>
               <a:rPr lang="en-US"/>
-              <a:t>Edit Master text styles</a:t>
+              <a:t>Click to edit Master text styles</a:t>
             </a:r>
           </a:p>
           <a:p>
@@ -511,14 +489,14 @@
               <a:rPr lang="en-US"/>
               <a:t>Fifth level</a:t>
             </a:r>
-            <a:endParaRPr lang="en-CA"/>
+            <a:endParaRPr lang="en-CA" dirty="0"/>
           </a:p>
         </p:txBody>
       </p:sp>
     </p:spTree>
     <p:extLst>
       <p:ext uri="{BB962C8B-B14F-4D97-AF65-F5344CB8AC3E}">
-        <p14:creationId xmlns:p14="http://schemas.microsoft.com/office/powerpoint/2010/main" val="2659973732"/>
+        <p14:creationId xmlns:p14="http://schemas.microsoft.com/office/powerpoint/2010/main" val="4213625504"/>
       </p:ext>
     </p:extLst>
   </p:cSld>
@@ -625,6 +603,9 @@
           <a:bodyPr/>
           <a:lstStyle>
             <a:lvl1pPr>
+              <a:buClr>
+                <a:schemeClr val="accent6"/>
+              </a:buClr>
               <a:defRPr>
                 <a:solidFill>
                   <a:srgbClr val="FFFFFF"/>
@@ -632,6 +613,9 @@
               </a:defRPr>
             </a:lvl1pPr>
             <a:lvl2pPr>
+              <a:buClr>
+                <a:schemeClr val="accent6"/>
+              </a:buClr>
               <a:defRPr>
                 <a:solidFill>
                   <a:srgbClr val="FFFFFF"/>
@@ -639,6 +623,9 @@
               </a:defRPr>
             </a:lvl2pPr>
             <a:lvl3pPr>
+              <a:buClr>
+                <a:schemeClr val="accent6"/>
+              </a:buClr>
               <a:defRPr>
                 <a:solidFill>
                   <a:srgbClr val="FFFFFF"/>
@@ -646,6 +633,9 @@
               </a:defRPr>
             </a:lvl3pPr>
             <a:lvl4pPr>
+              <a:buClr>
+                <a:schemeClr val="accent6"/>
+              </a:buClr>
               <a:defRPr>
                 <a:solidFill>
                   <a:srgbClr val="FFFFFF"/>
@@ -653,6 +643,9 @@
               </a:defRPr>
             </a:lvl4pPr>
             <a:lvl5pPr>
+              <a:buClr>
+                <a:schemeClr val="accent6"/>
+              </a:buClr>
               <a:defRPr>
                 <a:solidFill>
                   <a:srgbClr val="FFFFFF"/>
@@ -664,7 +657,7 @@
             <a:pPr lvl="0"/>
             <a:r>
               <a:rPr lang="en-US"/>
-              <a:t>Edit Master text styles</a:t>
+              <a:t>Click to edit Master text styles</a:t>
             </a:r>
           </a:p>
           <a:p>
@@ -701,7 +694,7 @@
     </p:spTree>
     <p:extLst>
       <p:ext uri="{BB962C8B-B14F-4D97-AF65-F5344CB8AC3E}">
-        <p14:creationId xmlns:p14="http://schemas.microsoft.com/office/powerpoint/2010/main" val="2926272284"/>
+        <p14:creationId xmlns:p14="http://schemas.microsoft.com/office/powerpoint/2010/main" val="34040252"/>
       </p:ext>
     </p:extLst>
   </p:cSld>
@@ -809,7 +802,7 @@
           <a:lstStyle>
             <a:lvl1pPr>
               <a:buClr>
-                <a:schemeClr val="tx1"/>
+                <a:schemeClr val="accent6"/>
               </a:buClr>
               <a:defRPr>
                 <a:solidFill>
@@ -819,7 +812,7 @@
             </a:lvl1pPr>
             <a:lvl2pPr>
               <a:buClr>
-                <a:schemeClr val="tx1"/>
+                <a:schemeClr val="accent6"/>
               </a:buClr>
               <a:defRPr>
                 <a:solidFill>
@@ -829,7 +822,7 @@
             </a:lvl2pPr>
             <a:lvl3pPr>
               <a:buClr>
-                <a:schemeClr val="tx1"/>
+                <a:schemeClr val="accent6"/>
               </a:buClr>
               <a:defRPr>
                 <a:solidFill>
@@ -839,7 +832,7 @@
             </a:lvl3pPr>
             <a:lvl4pPr>
               <a:buClr>
-                <a:schemeClr val="tx1"/>
+                <a:schemeClr val="accent6"/>
               </a:buClr>
               <a:defRPr>
                 <a:solidFill>
@@ -849,7 +842,7 @@
             </a:lvl4pPr>
             <a:lvl5pPr>
               <a:buClr>
-                <a:schemeClr val="tx1"/>
+                <a:schemeClr val="accent6"/>
               </a:buClr>
               <a:defRPr>
                 <a:solidFill>
@@ -862,7 +855,7 @@
             <a:pPr lvl="0"/>
             <a:r>
               <a:rPr lang="en-US"/>
-              <a:t>Edit Master text styles</a:t>
+              <a:t>Click to edit Master text styles</a:t>
             </a:r>
           </a:p>
           <a:p>
@@ -899,7 +892,7 @@
     </p:spTree>
     <p:extLst>
       <p:ext uri="{BB962C8B-B14F-4D97-AF65-F5344CB8AC3E}">
-        <p14:creationId xmlns:p14="http://schemas.microsoft.com/office/powerpoint/2010/main" val="3606163647"/>
+        <p14:creationId xmlns:p14="http://schemas.microsoft.com/office/powerpoint/2010/main" val="3275119705"/>
       </p:ext>
     </p:extLst>
   </p:cSld>
@@ -909,13 +902,13 @@
 </p:sldLayout>
 </file>
 
-<file path=ppt/slideMasters/slideMaster1.xml><?xml version="1.0" encoding="utf-8"?>
-<p:sldMaster xmlns:a="http://schemas.openxmlformats.org/drawingml/2006/main" xmlns:r="http://schemas.openxmlformats.org/officeDocument/2006/relationships" xmlns:p="http://schemas.openxmlformats.org/presentationml/2006/main">
-  <p:cSld>
+<file path=ppt/slideLayouts/slideLayout5.xml><?xml version="1.0" encoding="utf-8"?>
+<p:sldLayout xmlns:a="http://schemas.openxmlformats.org/drawingml/2006/main" xmlns:r="http://schemas.openxmlformats.org/officeDocument/2006/relationships" xmlns:p="http://schemas.openxmlformats.org/presentationml/2006/main" type="obj" preserve="1">
+  <p:cSld name="4_Title and Content">
     <p:bg>
       <p:bgPr>
         <a:blipFill dpi="0" rotWithShape="1">
-          <a:blip r:embed="rId6">
+          <a:blip r:embed="rId2">
             <a:lum/>
           </a:blip>
           <a:srcRect/>
@@ -942,6 +935,600 @@
       </p:grpSpPr>
       <p:sp>
         <p:nvSpPr>
+          <p:cNvPr id="2" name="Title 1">
+            <a:extLst>
+              <a:ext uri="{FF2B5EF4-FFF2-40B4-BE49-F238E27FC236}">
+                <a16:creationId xmlns:a16="http://schemas.microsoft.com/office/drawing/2014/main" id="{0ECBFABF-0FF7-46A7-A3E7-B6C1EFC20E36}"/>
+              </a:ext>
+            </a:extLst>
+          </p:cNvPr>
+          <p:cNvSpPr>
+            <a:spLocks noGrp="1"/>
+          </p:cNvSpPr>
+          <p:nvPr>
+            <p:ph type="title"/>
+          </p:nvPr>
+        </p:nvSpPr>
+        <p:spPr/>
+        <p:txBody>
+          <a:bodyPr/>
+          <a:lstStyle>
+            <a:lvl1pPr>
+              <a:defRPr>
+                <a:solidFill>
+                  <a:srgbClr val="171717"/>
+                </a:solidFill>
+              </a:defRPr>
+            </a:lvl1pPr>
+          </a:lstStyle>
+          <a:p>
+            <a:r>
+              <a:rPr lang="en-US"/>
+              <a:t>Click to edit Master title style</a:t>
+            </a:r>
+            <a:endParaRPr lang="en-CA"/>
+          </a:p>
+        </p:txBody>
+      </p:sp>
+      <p:sp>
+        <p:nvSpPr>
+          <p:cNvPr id="3" name="Content Placeholder 2">
+            <a:extLst>
+              <a:ext uri="{FF2B5EF4-FFF2-40B4-BE49-F238E27FC236}">
+                <a16:creationId xmlns:a16="http://schemas.microsoft.com/office/drawing/2014/main" id="{85D1B3E0-28C0-49B4-B789-CFB199546EE9}"/>
+              </a:ext>
+            </a:extLst>
+          </p:cNvPr>
+          <p:cNvSpPr>
+            <a:spLocks noGrp="1"/>
+          </p:cNvSpPr>
+          <p:nvPr>
+            <p:ph idx="1"/>
+          </p:nvPr>
+        </p:nvSpPr>
+        <p:spPr>
+          <a:xfrm>
+            <a:off x="838200" y="1825624"/>
+            <a:ext cx="10515600" cy="4835479"/>
+          </a:xfrm>
+          <a:prstGeom prst="rect">
+            <a:avLst/>
+          </a:prstGeom>
+        </p:spPr>
+        <p:txBody>
+          <a:bodyPr/>
+          <a:lstStyle>
+            <a:lvl1pPr>
+              <a:buClr>
+                <a:schemeClr val="accent2"/>
+              </a:buClr>
+              <a:defRPr>
+                <a:solidFill>
+                  <a:srgbClr val="171717"/>
+                </a:solidFill>
+              </a:defRPr>
+            </a:lvl1pPr>
+            <a:lvl2pPr>
+              <a:buClr>
+                <a:schemeClr val="accent2"/>
+              </a:buClr>
+              <a:defRPr>
+                <a:solidFill>
+                  <a:srgbClr val="171717"/>
+                </a:solidFill>
+              </a:defRPr>
+            </a:lvl2pPr>
+            <a:lvl3pPr>
+              <a:buClr>
+                <a:schemeClr val="accent2"/>
+              </a:buClr>
+              <a:defRPr>
+                <a:solidFill>
+                  <a:srgbClr val="171717"/>
+                </a:solidFill>
+              </a:defRPr>
+            </a:lvl3pPr>
+            <a:lvl4pPr>
+              <a:buClr>
+                <a:schemeClr val="accent2"/>
+              </a:buClr>
+              <a:defRPr>
+                <a:solidFill>
+                  <a:srgbClr val="171717"/>
+                </a:solidFill>
+              </a:defRPr>
+            </a:lvl4pPr>
+            <a:lvl5pPr>
+              <a:buClr>
+                <a:schemeClr val="accent2"/>
+              </a:buClr>
+              <a:defRPr>
+                <a:solidFill>
+                  <a:srgbClr val="171717"/>
+                </a:solidFill>
+              </a:defRPr>
+            </a:lvl5pPr>
+          </a:lstStyle>
+          <a:p>
+            <a:pPr lvl="0"/>
+            <a:r>
+              <a:rPr lang="en-US"/>
+              <a:t>Click to edit Master text styles</a:t>
+            </a:r>
+          </a:p>
+          <a:p>
+            <a:pPr lvl="1"/>
+            <a:r>
+              <a:rPr lang="en-US"/>
+              <a:t>Second level</a:t>
+            </a:r>
+          </a:p>
+          <a:p>
+            <a:pPr lvl="2"/>
+            <a:r>
+              <a:rPr lang="en-US"/>
+              <a:t>Third level</a:t>
+            </a:r>
+          </a:p>
+          <a:p>
+            <a:pPr lvl="3"/>
+            <a:r>
+              <a:rPr lang="en-US"/>
+              <a:t>Fourth level</a:t>
+            </a:r>
+          </a:p>
+          <a:p>
+            <a:pPr lvl="4"/>
+            <a:r>
+              <a:rPr lang="en-US"/>
+              <a:t>Fifth level</a:t>
+            </a:r>
+            <a:endParaRPr lang="en-CA" dirty="0"/>
+          </a:p>
+        </p:txBody>
+      </p:sp>
+    </p:spTree>
+    <p:extLst>
+      <p:ext uri="{BB962C8B-B14F-4D97-AF65-F5344CB8AC3E}">
+        <p14:creationId xmlns:p14="http://schemas.microsoft.com/office/powerpoint/2010/main" val="1693743101"/>
+      </p:ext>
+    </p:extLst>
+  </p:cSld>
+  <p:clrMapOvr>
+    <a:masterClrMapping/>
+  </p:clrMapOvr>
+</p:sldLayout>
+</file>
+
+<file path=ppt/slideLayouts/slideLayout6.xml><?xml version="1.0" encoding="utf-8"?>
+<p:sldLayout xmlns:a="http://schemas.openxmlformats.org/drawingml/2006/main" xmlns:r="http://schemas.openxmlformats.org/officeDocument/2006/relationships" xmlns:p="http://schemas.openxmlformats.org/presentationml/2006/main" type="obj" preserve="1">
+  <p:cSld name="5_Title and Content">
+    <p:bg>
+      <p:bgPr>
+        <a:blipFill dpi="0" rotWithShape="1">
+          <a:blip r:embed="rId2">
+            <a:lum/>
+          </a:blip>
+          <a:srcRect/>
+          <a:stretch>
+            <a:fillRect/>
+          </a:stretch>
+        </a:blipFill>
+        <a:effectLst/>
+      </p:bgPr>
+    </p:bg>
+    <p:spTree>
+      <p:nvGrpSpPr>
+        <p:cNvPr id="1" name=""/>
+        <p:cNvGrpSpPr/>
+        <p:nvPr/>
+      </p:nvGrpSpPr>
+      <p:grpSpPr>
+        <a:xfrm>
+          <a:off x="0" y="0"/>
+          <a:ext cx="0" cy="0"/>
+          <a:chOff x="0" y="0"/>
+          <a:chExt cx="0" cy="0"/>
+        </a:xfrm>
+      </p:grpSpPr>
+      <p:sp>
+        <p:nvSpPr>
+          <p:cNvPr id="2" name="Title 1">
+            <a:extLst>
+              <a:ext uri="{FF2B5EF4-FFF2-40B4-BE49-F238E27FC236}">
+                <a16:creationId xmlns:a16="http://schemas.microsoft.com/office/drawing/2014/main" id="{0ECBFABF-0FF7-46A7-A3E7-B6C1EFC20E36}"/>
+              </a:ext>
+            </a:extLst>
+          </p:cNvPr>
+          <p:cNvSpPr>
+            <a:spLocks noGrp="1"/>
+          </p:cNvSpPr>
+          <p:nvPr>
+            <p:ph type="title"/>
+          </p:nvPr>
+        </p:nvSpPr>
+        <p:spPr/>
+        <p:txBody>
+          <a:bodyPr/>
+          <a:lstStyle>
+            <a:lvl1pPr>
+              <a:defRPr>
+                <a:solidFill>
+                  <a:schemeClr val="tx1"/>
+                </a:solidFill>
+              </a:defRPr>
+            </a:lvl1pPr>
+          </a:lstStyle>
+          <a:p>
+            <a:r>
+              <a:rPr lang="en-US"/>
+              <a:t>Click to edit Master title style</a:t>
+            </a:r>
+            <a:endParaRPr lang="en-CA"/>
+          </a:p>
+        </p:txBody>
+      </p:sp>
+      <p:sp>
+        <p:nvSpPr>
+          <p:cNvPr id="3" name="Content Placeholder 2">
+            <a:extLst>
+              <a:ext uri="{FF2B5EF4-FFF2-40B4-BE49-F238E27FC236}">
+                <a16:creationId xmlns:a16="http://schemas.microsoft.com/office/drawing/2014/main" id="{85D1B3E0-28C0-49B4-B789-CFB199546EE9}"/>
+              </a:ext>
+            </a:extLst>
+          </p:cNvPr>
+          <p:cNvSpPr>
+            <a:spLocks noGrp="1"/>
+          </p:cNvSpPr>
+          <p:nvPr>
+            <p:ph idx="1"/>
+          </p:nvPr>
+        </p:nvSpPr>
+        <p:spPr>
+          <a:xfrm>
+            <a:off x="838200" y="1825624"/>
+            <a:ext cx="10515600" cy="4835479"/>
+          </a:xfrm>
+          <a:prstGeom prst="rect">
+            <a:avLst/>
+          </a:prstGeom>
+        </p:spPr>
+        <p:txBody>
+          <a:bodyPr/>
+          <a:lstStyle>
+            <a:lvl1pPr>
+              <a:buClr>
+                <a:schemeClr val="accent2"/>
+              </a:buClr>
+              <a:defRPr>
+                <a:solidFill>
+                  <a:schemeClr val="tx1"/>
+                </a:solidFill>
+              </a:defRPr>
+            </a:lvl1pPr>
+            <a:lvl2pPr>
+              <a:buClr>
+                <a:schemeClr val="accent2"/>
+              </a:buClr>
+              <a:defRPr>
+                <a:solidFill>
+                  <a:schemeClr val="tx1"/>
+                </a:solidFill>
+              </a:defRPr>
+            </a:lvl2pPr>
+            <a:lvl3pPr>
+              <a:buClr>
+                <a:schemeClr val="accent2"/>
+              </a:buClr>
+              <a:defRPr>
+                <a:solidFill>
+                  <a:schemeClr val="tx1"/>
+                </a:solidFill>
+              </a:defRPr>
+            </a:lvl3pPr>
+            <a:lvl4pPr>
+              <a:buClr>
+                <a:schemeClr val="accent2"/>
+              </a:buClr>
+              <a:defRPr>
+                <a:solidFill>
+                  <a:schemeClr val="tx1"/>
+                </a:solidFill>
+              </a:defRPr>
+            </a:lvl4pPr>
+            <a:lvl5pPr>
+              <a:buClr>
+                <a:schemeClr val="accent2"/>
+              </a:buClr>
+              <a:defRPr>
+                <a:solidFill>
+                  <a:schemeClr val="tx1"/>
+                </a:solidFill>
+              </a:defRPr>
+            </a:lvl5pPr>
+          </a:lstStyle>
+          <a:p>
+            <a:pPr lvl="0"/>
+            <a:r>
+              <a:rPr lang="en-US"/>
+              <a:t>Click to edit Master text styles</a:t>
+            </a:r>
+          </a:p>
+          <a:p>
+            <a:pPr lvl="1"/>
+            <a:r>
+              <a:rPr lang="en-US"/>
+              <a:t>Second level</a:t>
+            </a:r>
+          </a:p>
+          <a:p>
+            <a:pPr lvl="2"/>
+            <a:r>
+              <a:rPr lang="en-US"/>
+              <a:t>Third level</a:t>
+            </a:r>
+          </a:p>
+          <a:p>
+            <a:pPr lvl="3"/>
+            <a:r>
+              <a:rPr lang="en-US"/>
+              <a:t>Fourth level</a:t>
+            </a:r>
+          </a:p>
+          <a:p>
+            <a:pPr lvl="4"/>
+            <a:r>
+              <a:rPr lang="en-US"/>
+              <a:t>Fifth level</a:t>
+            </a:r>
+            <a:endParaRPr lang="en-CA" dirty="0"/>
+          </a:p>
+        </p:txBody>
+      </p:sp>
+    </p:spTree>
+    <p:extLst>
+      <p:ext uri="{BB962C8B-B14F-4D97-AF65-F5344CB8AC3E}">
+        <p14:creationId xmlns:p14="http://schemas.microsoft.com/office/powerpoint/2010/main" val="553522736"/>
+      </p:ext>
+    </p:extLst>
+  </p:cSld>
+  <p:clrMapOvr>
+    <a:masterClrMapping/>
+  </p:clrMapOvr>
+</p:sldLayout>
+</file>
+
+<file path=ppt/slideLayouts/slideLayout7.xml><?xml version="1.0" encoding="utf-8"?>
+<p:sldLayout xmlns:a="http://schemas.openxmlformats.org/drawingml/2006/main" xmlns:r="http://schemas.openxmlformats.org/officeDocument/2006/relationships" xmlns:p="http://schemas.openxmlformats.org/presentationml/2006/main" type="obj" preserve="1">
+  <p:cSld name="6_Title and Content">
+    <p:bg>
+      <p:bgPr>
+        <a:blipFill dpi="0" rotWithShape="1">
+          <a:blip r:embed="rId2">
+            <a:lum/>
+          </a:blip>
+          <a:srcRect/>
+          <a:stretch>
+            <a:fillRect/>
+          </a:stretch>
+        </a:blipFill>
+        <a:effectLst/>
+      </p:bgPr>
+    </p:bg>
+    <p:spTree>
+      <p:nvGrpSpPr>
+        <p:cNvPr id="1" name=""/>
+        <p:cNvGrpSpPr/>
+        <p:nvPr/>
+      </p:nvGrpSpPr>
+      <p:grpSpPr>
+        <a:xfrm>
+          <a:off x="0" y="0"/>
+          <a:ext cx="0" cy="0"/>
+          <a:chOff x="0" y="0"/>
+          <a:chExt cx="0" cy="0"/>
+        </a:xfrm>
+      </p:grpSpPr>
+      <p:sp>
+        <p:nvSpPr>
+          <p:cNvPr id="2" name="Title 1">
+            <a:extLst>
+              <a:ext uri="{FF2B5EF4-FFF2-40B4-BE49-F238E27FC236}">
+                <a16:creationId xmlns:a16="http://schemas.microsoft.com/office/drawing/2014/main" id="{0ECBFABF-0FF7-46A7-A3E7-B6C1EFC20E36}"/>
+              </a:ext>
+            </a:extLst>
+          </p:cNvPr>
+          <p:cNvSpPr>
+            <a:spLocks noGrp="1"/>
+          </p:cNvSpPr>
+          <p:nvPr>
+            <p:ph type="title"/>
+          </p:nvPr>
+        </p:nvSpPr>
+        <p:spPr/>
+        <p:txBody>
+          <a:bodyPr/>
+          <a:lstStyle>
+            <a:lvl1pPr>
+              <a:defRPr>
+                <a:solidFill>
+                  <a:srgbClr val="FFFFFF"/>
+                </a:solidFill>
+              </a:defRPr>
+            </a:lvl1pPr>
+          </a:lstStyle>
+          <a:p>
+            <a:r>
+              <a:rPr lang="en-US"/>
+              <a:t>Click to edit Master title style</a:t>
+            </a:r>
+            <a:endParaRPr lang="en-CA"/>
+          </a:p>
+        </p:txBody>
+      </p:sp>
+      <p:sp>
+        <p:nvSpPr>
+          <p:cNvPr id="3" name="Content Placeholder 2">
+            <a:extLst>
+              <a:ext uri="{FF2B5EF4-FFF2-40B4-BE49-F238E27FC236}">
+                <a16:creationId xmlns:a16="http://schemas.microsoft.com/office/drawing/2014/main" id="{85D1B3E0-28C0-49B4-B789-CFB199546EE9}"/>
+              </a:ext>
+            </a:extLst>
+          </p:cNvPr>
+          <p:cNvSpPr>
+            <a:spLocks noGrp="1"/>
+          </p:cNvSpPr>
+          <p:nvPr>
+            <p:ph idx="1"/>
+          </p:nvPr>
+        </p:nvSpPr>
+        <p:spPr>
+          <a:xfrm>
+            <a:off x="838200" y="1825624"/>
+            <a:ext cx="10515600" cy="4835479"/>
+          </a:xfrm>
+          <a:prstGeom prst="rect">
+            <a:avLst/>
+          </a:prstGeom>
+        </p:spPr>
+        <p:txBody>
+          <a:bodyPr/>
+          <a:lstStyle>
+            <a:lvl1pPr>
+              <a:buClr>
+                <a:schemeClr val="accent2"/>
+              </a:buClr>
+              <a:defRPr>
+                <a:solidFill>
+                  <a:srgbClr val="FFFFFF"/>
+                </a:solidFill>
+              </a:defRPr>
+            </a:lvl1pPr>
+            <a:lvl2pPr>
+              <a:buClr>
+                <a:schemeClr val="accent2"/>
+              </a:buClr>
+              <a:defRPr>
+                <a:solidFill>
+                  <a:srgbClr val="FFFFFF"/>
+                </a:solidFill>
+              </a:defRPr>
+            </a:lvl2pPr>
+            <a:lvl3pPr>
+              <a:buClr>
+                <a:schemeClr val="accent2"/>
+              </a:buClr>
+              <a:defRPr>
+                <a:solidFill>
+                  <a:srgbClr val="FFFFFF"/>
+                </a:solidFill>
+              </a:defRPr>
+            </a:lvl3pPr>
+            <a:lvl4pPr>
+              <a:buClr>
+                <a:schemeClr val="accent2"/>
+              </a:buClr>
+              <a:defRPr>
+                <a:solidFill>
+                  <a:srgbClr val="FFFFFF"/>
+                </a:solidFill>
+              </a:defRPr>
+            </a:lvl4pPr>
+            <a:lvl5pPr>
+              <a:buClr>
+                <a:schemeClr val="accent2"/>
+              </a:buClr>
+              <a:defRPr>
+                <a:solidFill>
+                  <a:srgbClr val="FFFFFF"/>
+                </a:solidFill>
+              </a:defRPr>
+            </a:lvl5pPr>
+          </a:lstStyle>
+          <a:p>
+            <a:pPr lvl="0"/>
+            <a:r>
+              <a:rPr lang="en-US"/>
+              <a:t>Click to edit Master text styles</a:t>
+            </a:r>
+          </a:p>
+          <a:p>
+            <a:pPr lvl="1"/>
+            <a:r>
+              <a:rPr lang="en-US"/>
+              <a:t>Second level</a:t>
+            </a:r>
+          </a:p>
+          <a:p>
+            <a:pPr lvl="2"/>
+            <a:r>
+              <a:rPr lang="en-US"/>
+              <a:t>Third level</a:t>
+            </a:r>
+          </a:p>
+          <a:p>
+            <a:pPr lvl="3"/>
+            <a:r>
+              <a:rPr lang="en-US"/>
+              <a:t>Fourth level</a:t>
+            </a:r>
+          </a:p>
+          <a:p>
+            <a:pPr lvl="4"/>
+            <a:r>
+              <a:rPr lang="en-US"/>
+              <a:t>Fifth level</a:t>
+            </a:r>
+            <a:endParaRPr lang="en-CA" dirty="0"/>
+          </a:p>
+        </p:txBody>
+      </p:sp>
+    </p:spTree>
+    <p:extLst>
+      <p:ext uri="{BB962C8B-B14F-4D97-AF65-F5344CB8AC3E}">
+        <p14:creationId xmlns:p14="http://schemas.microsoft.com/office/powerpoint/2010/main" val="1657768013"/>
+      </p:ext>
+    </p:extLst>
+  </p:cSld>
+  <p:clrMapOvr>
+    <a:masterClrMapping/>
+  </p:clrMapOvr>
+</p:sldLayout>
+</file>
+
+<file path=ppt/slideMasters/slideMaster1.xml><?xml version="1.0" encoding="utf-8"?>
+<p:sldMaster xmlns:a="http://schemas.openxmlformats.org/drawingml/2006/main" xmlns:r="http://schemas.openxmlformats.org/officeDocument/2006/relationships" xmlns:p="http://schemas.openxmlformats.org/presentationml/2006/main">
+  <p:cSld>
+    <p:bg>
+      <p:bgPr>
+        <a:blipFill dpi="0" rotWithShape="1">
+          <a:blip r:embed="rId9">
+            <a:lum/>
+          </a:blip>
+          <a:srcRect/>
+          <a:stretch>
+            <a:fillRect/>
+          </a:stretch>
+        </a:blipFill>
+        <a:effectLst/>
+      </p:bgPr>
+    </p:bg>
+    <p:spTree>
+      <p:nvGrpSpPr>
+        <p:cNvPr id="1" name=""/>
+        <p:cNvGrpSpPr/>
+        <p:nvPr/>
+      </p:nvGrpSpPr>
+      <p:grpSpPr>
+        <a:xfrm>
+          <a:off x="0" y="0"/>
+          <a:ext cx="0" cy="0"/>
+          <a:chOff x="0" y="0"/>
+          <a:chExt cx="0" cy="0"/>
+        </a:xfrm>
+      </p:grpSpPr>
+      <p:sp>
+        <p:nvSpPr>
           <p:cNvPr id="2" name="Title Placeholder 1">
             <a:extLst>
               <a:ext uri="{FF2B5EF4-FFF2-40B4-BE49-F238E27FC236}">
@@ -1013,7 +1600,7 @@
             <a:pPr lvl="0"/>
             <a:r>
               <a:rPr lang="en-US"/>
-              <a:t>Edit Master text styles</a:t>
+              <a:t>Click to edit Master text styles</a:t>
             </a:r>
           </a:p>
           <a:p>
@@ -1050,16 +1637,19 @@
     </p:spTree>
     <p:extLst>
       <p:ext uri="{BB962C8B-B14F-4D97-AF65-F5344CB8AC3E}">
-        <p14:creationId xmlns:p14="http://schemas.microsoft.com/office/powerpoint/2010/main" val="86306749"/>
+        <p14:creationId xmlns:p14="http://schemas.microsoft.com/office/powerpoint/2010/main" val="1668731381"/>
       </p:ext>
     </p:extLst>
   </p:cSld>
   <p:clrMap bg1="lt1" tx1="dk1" bg2="lt2" tx2="dk2" accent1="accent1" accent2="accent2" accent3="accent3" accent4="accent4" accent5="accent5" accent6="accent6" hlink="hlink" folHlink="folHlink"/>
   <p:sldLayoutIdLst>
-    <p:sldLayoutId id="2147483666" r:id="rId1"/>
-    <p:sldLayoutId id="2147483667" r:id="rId2"/>
-    <p:sldLayoutId id="2147483668" r:id="rId3"/>
-    <p:sldLayoutId id="2147483669" r:id="rId4"/>
+    <p:sldLayoutId id="2147483671" r:id="rId1"/>
+    <p:sldLayoutId id="2147483672" r:id="rId2"/>
+    <p:sldLayoutId id="2147483673" r:id="rId3"/>
+    <p:sldLayoutId id="2147483674" r:id="rId4"/>
+    <p:sldLayoutId id="2147483675" r:id="rId5"/>
+    <p:sldLayoutId id="2147483676" r:id="rId6"/>
+    <p:sldLayoutId id="2147483677" r:id="rId7"/>
   </p:sldLayoutIdLst>
   <p:txStyles>
     <p:titleStyle>
@@ -5393,6 +5983,41 @@
       </p:sp>
       <p:sp>
         <p:nvSpPr>
+          <p:cNvPr id="14" name="Content Placeholder 2">
+            <a:extLst>
+              <a:ext uri="{FF2B5EF4-FFF2-40B4-BE49-F238E27FC236}">
+                <a16:creationId xmlns:a16="http://schemas.microsoft.com/office/drawing/2014/main" id="{41A55381-03D0-4DB3-A1E2-922A8A625420}"/>
+              </a:ext>
+            </a:extLst>
+          </p:cNvPr>
+          <p:cNvSpPr>
+            <a:spLocks noGrp="1"/>
+          </p:cNvSpPr>
+          <p:nvPr>
+            <p:ph idx="1"/>
+          </p:nvPr>
+        </p:nvSpPr>
+        <p:spPr>
+          <a:xfrm>
+            <a:off x="838200" y="1825625"/>
+            <a:ext cx="6811682" cy="3257125"/>
+          </a:xfrm>
+        </p:spPr>
+        <p:txBody>
+          <a:bodyPr>
+            <a:normAutofit/>
+          </a:bodyPr>
+          <a:lstStyle/>
+          <a:p>
+            <a:r>
+              <a:rPr lang="en-US" b="1" dirty="0"/>
+              <a:t>Global Scope</a:t>
+            </a:r>
+          </a:p>
+        </p:txBody>
+      </p:sp>
+      <p:sp>
+        <p:nvSpPr>
           <p:cNvPr id="9" name="Rectangle: Rounded Corners 8">
             <a:extLst>
               <a:ext uri="{FF2B5EF4-FFF2-40B4-BE49-F238E27FC236}">
@@ -5525,41 +6150,6 @@
       </p:sp>
       <p:sp>
         <p:nvSpPr>
-          <p:cNvPr id="14" name="Content Placeholder 2">
-            <a:extLst>
-              <a:ext uri="{FF2B5EF4-FFF2-40B4-BE49-F238E27FC236}">
-                <a16:creationId xmlns:a16="http://schemas.microsoft.com/office/drawing/2014/main" id="{41A55381-03D0-4DB3-A1E2-922A8A625420}"/>
-              </a:ext>
-            </a:extLst>
-          </p:cNvPr>
-          <p:cNvSpPr>
-            <a:spLocks noGrp="1"/>
-          </p:cNvSpPr>
-          <p:nvPr>
-            <p:ph idx="1"/>
-          </p:nvPr>
-        </p:nvSpPr>
-        <p:spPr>
-          <a:xfrm>
-            <a:off x="838200" y="1825625"/>
-            <a:ext cx="6811682" cy="3257125"/>
-          </a:xfrm>
-        </p:spPr>
-        <p:txBody>
-          <a:bodyPr>
-            <a:normAutofit/>
-          </a:bodyPr>
-          <a:lstStyle/>
-          <a:p>
-            <a:r>
-              <a:rPr lang="en-US" b="1" dirty="0"/>
-              <a:t>Global Scope</a:t>
-            </a:r>
-          </a:p>
-        </p:txBody>
-      </p:sp>
-      <p:sp>
-        <p:nvSpPr>
           <p:cNvPr id="16" name="TextBox 15">
             <a:extLst>
               <a:ext uri="{FF2B5EF4-FFF2-40B4-BE49-F238E27FC236}">
@@ -5812,25 +6402,6 @@
             </a:r>
           </a:p>
           <a:p>
-            <a:pPr lvl="1"/>
-            <a:r>
-              <a:rPr lang="en-US" dirty="0"/>
-              <a:t>Reading</a:t>
-            </a:r>
-            <a:r>
-              <a:rPr lang="en-US" dirty="0">
-                <a:solidFill>
-                  <a:schemeClr val="accent1"/>
-                </a:solidFill>
-              </a:rPr>
-              <a:t>:</a:t>
-            </a:r>
-            <a:r>
-              <a:rPr lang="en-US" dirty="0"/>
-              <a:t> Chapter 3</a:t>
-            </a:r>
-          </a:p>
-          <a:p>
             <a:r>
               <a:rPr lang="en-US" b="1" dirty="0"/>
               <a:t>Lecture </a:t>
@@ -5852,13 +6423,6 @@
             </a:r>
           </a:p>
           <a:p>
-            <a:pPr lvl="1"/>
-            <a:r>
-              <a:rPr lang="en-US" b="1" dirty="0"/>
-              <a:t>Reading: Chapter 3</a:t>
-            </a:r>
-          </a:p>
-          <a:p>
             <a:r>
               <a:rPr lang="en-US" b="1" dirty="0"/>
               <a:t>Lecture </a:t>
@@ -5870,13 +6434,6 @@
                 </a:solidFill>
               </a:rPr>
               <a:t>2.3</a:t>
-            </a:r>
-          </a:p>
-          <a:p>
-            <a:pPr lvl="1"/>
-            <a:r>
-              <a:rPr lang="en-US" dirty="0"/>
-              <a:t>Engineering design</a:t>
             </a:r>
           </a:p>
           <a:p>
@@ -5956,6 +6513,41 @@
             <a:r>
               <a:rPr lang="en-US" b="1" dirty="0"/>
               <a:t>Variable Scope</a:t>
+            </a:r>
+          </a:p>
+        </p:txBody>
+      </p:sp>
+      <p:sp>
+        <p:nvSpPr>
+          <p:cNvPr id="14" name="Content Placeholder 2">
+            <a:extLst>
+              <a:ext uri="{FF2B5EF4-FFF2-40B4-BE49-F238E27FC236}">
+                <a16:creationId xmlns:a16="http://schemas.microsoft.com/office/drawing/2014/main" id="{41A55381-03D0-4DB3-A1E2-922A8A625420}"/>
+              </a:ext>
+            </a:extLst>
+          </p:cNvPr>
+          <p:cNvSpPr>
+            <a:spLocks noGrp="1"/>
+          </p:cNvSpPr>
+          <p:nvPr>
+            <p:ph idx="1"/>
+          </p:nvPr>
+        </p:nvSpPr>
+        <p:spPr>
+          <a:xfrm>
+            <a:off x="838200" y="1825625"/>
+            <a:ext cx="6811682" cy="3257125"/>
+          </a:xfrm>
+        </p:spPr>
+        <p:txBody>
+          <a:bodyPr>
+            <a:normAutofit/>
+          </a:bodyPr>
+          <a:lstStyle/>
+          <a:p>
+            <a:r>
+              <a:rPr lang="en-US" b="1" dirty="0"/>
+              <a:t>Global Scope</a:t>
             </a:r>
           </a:p>
         </p:txBody>
@@ -6094,41 +6686,6 @@
       </p:sp>
       <p:sp>
         <p:nvSpPr>
-          <p:cNvPr id="14" name="Content Placeholder 2">
-            <a:extLst>
-              <a:ext uri="{FF2B5EF4-FFF2-40B4-BE49-F238E27FC236}">
-                <a16:creationId xmlns:a16="http://schemas.microsoft.com/office/drawing/2014/main" id="{41A55381-03D0-4DB3-A1E2-922A8A625420}"/>
-              </a:ext>
-            </a:extLst>
-          </p:cNvPr>
-          <p:cNvSpPr>
-            <a:spLocks noGrp="1"/>
-          </p:cNvSpPr>
-          <p:nvPr>
-            <p:ph idx="1"/>
-          </p:nvPr>
-        </p:nvSpPr>
-        <p:spPr>
-          <a:xfrm>
-            <a:off x="838200" y="1825625"/>
-            <a:ext cx="6811682" cy="3257125"/>
-          </a:xfrm>
-        </p:spPr>
-        <p:txBody>
-          <a:bodyPr>
-            <a:normAutofit/>
-          </a:bodyPr>
-          <a:lstStyle/>
-          <a:p>
-            <a:r>
-              <a:rPr lang="en-US" b="1" dirty="0"/>
-              <a:t>Global Scope</a:t>
-            </a:r>
-          </a:p>
-        </p:txBody>
-      </p:sp>
-      <p:sp>
-        <p:nvSpPr>
           <p:cNvPr id="16" name="TextBox 15">
             <a:extLst>
               <a:ext uri="{FF2B5EF4-FFF2-40B4-BE49-F238E27FC236}">
@@ -6434,6 +6991,41 @@
             <a:r>
               <a:rPr lang="en-US" b="1" dirty="0"/>
               <a:t>Variable Scope</a:t>
+            </a:r>
+          </a:p>
+        </p:txBody>
+      </p:sp>
+      <p:sp>
+        <p:nvSpPr>
+          <p:cNvPr id="14" name="Content Placeholder 2">
+            <a:extLst>
+              <a:ext uri="{FF2B5EF4-FFF2-40B4-BE49-F238E27FC236}">
+                <a16:creationId xmlns:a16="http://schemas.microsoft.com/office/drawing/2014/main" id="{41A55381-03D0-4DB3-A1E2-922A8A625420}"/>
+              </a:ext>
+            </a:extLst>
+          </p:cNvPr>
+          <p:cNvSpPr>
+            <a:spLocks noGrp="1"/>
+          </p:cNvSpPr>
+          <p:nvPr>
+            <p:ph idx="1"/>
+          </p:nvPr>
+        </p:nvSpPr>
+        <p:spPr>
+          <a:xfrm>
+            <a:off x="838200" y="1825625"/>
+            <a:ext cx="6811682" cy="3257125"/>
+          </a:xfrm>
+        </p:spPr>
+        <p:txBody>
+          <a:bodyPr>
+            <a:normAutofit/>
+          </a:bodyPr>
+          <a:lstStyle/>
+          <a:p>
+            <a:r>
+              <a:rPr lang="en-US" b="1" dirty="0"/>
+              <a:t>Global Scope</a:t>
             </a:r>
           </a:p>
         </p:txBody>
@@ -6572,41 +7164,6 @@
       </p:sp>
       <p:sp>
         <p:nvSpPr>
-          <p:cNvPr id="14" name="Content Placeholder 2">
-            <a:extLst>
-              <a:ext uri="{FF2B5EF4-FFF2-40B4-BE49-F238E27FC236}">
-                <a16:creationId xmlns:a16="http://schemas.microsoft.com/office/drawing/2014/main" id="{41A55381-03D0-4DB3-A1E2-922A8A625420}"/>
-              </a:ext>
-            </a:extLst>
-          </p:cNvPr>
-          <p:cNvSpPr>
-            <a:spLocks noGrp="1"/>
-          </p:cNvSpPr>
-          <p:nvPr>
-            <p:ph idx="1"/>
-          </p:nvPr>
-        </p:nvSpPr>
-        <p:spPr>
-          <a:xfrm>
-            <a:off x="838200" y="1825625"/>
-            <a:ext cx="6811682" cy="3257125"/>
-          </a:xfrm>
-        </p:spPr>
-        <p:txBody>
-          <a:bodyPr>
-            <a:normAutofit/>
-          </a:bodyPr>
-          <a:lstStyle/>
-          <a:p>
-            <a:r>
-              <a:rPr lang="en-US" b="1" dirty="0"/>
-              <a:t>Global Scope</a:t>
-            </a:r>
-          </a:p>
-        </p:txBody>
-      </p:sp>
-      <p:sp>
-        <p:nvSpPr>
           <p:cNvPr id="16" name="TextBox 15">
             <a:extLst>
               <a:ext uri="{FF2B5EF4-FFF2-40B4-BE49-F238E27FC236}">
@@ -6844,6 +7401,41 @@
       </p:sp>
       <p:sp>
         <p:nvSpPr>
+          <p:cNvPr id="14" name="Content Placeholder 2">
+            <a:extLst>
+              <a:ext uri="{FF2B5EF4-FFF2-40B4-BE49-F238E27FC236}">
+                <a16:creationId xmlns:a16="http://schemas.microsoft.com/office/drawing/2014/main" id="{41A55381-03D0-4DB3-A1E2-922A8A625420}"/>
+              </a:ext>
+            </a:extLst>
+          </p:cNvPr>
+          <p:cNvSpPr>
+            <a:spLocks noGrp="1"/>
+          </p:cNvSpPr>
+          <p:nvPr>
+            <p:ph idx="1"/>
+          </p:nvPr>
+        </p:nvSpPr>
+        <p:spPr>
+          <a:xfrm>
+            <a:off x="838200" y="1825625"/>
+            <a:ext cx="6811682" cy="3257125"/>
+          </a:xfrm>
+        </p:spPr>
+        <p:txBody>
+          <a:bodyPr>
+            <a:normAutofit/>
+          </a:bodyPr>
+          <a:lstStyle/>
+          <a:p>
+            <a:r>
+              <a:rPr lang="en-US" b="1" dirty="0"/>
+              <a:t>Global Scope</a:t>
+            </a:r>
+          </a:p>
+        </p:txBody>
+      </p:sp>
+      <p:sp>
+        <p:nvSpPr>
           <p:cNvPr id="9" name="Rectangle: Rounded Corners 8">
             <a:extLst>
               <a:ext uri="{FF2B5EF4-FFF2-40B4-BE49-F238E27FC236}">
@@ -6976,41 +7568,6 @@
       </p:sp>
       <p:sp>
         <p:nvSpPr>
-          <p:cNvPr id="14" name="Content Placeholder 2">
-            <a:extLst>
-              <a:ext uri="{FF2B5EF4-FFF2-40B4-BE49-F238E27FC236}">
-                <a16:creationId xmlns:a16="http://schemas.microsoft.com/office/drawing/2014/main" id="{41A55381-03D0-4DB3-A1E2-922A8A625420}"/>
-              </a:ext>
-            </a:extLst>
-          </p:cNvPr>
-          <p:cNvSpPr>
-            <a:spLocks noGrp="1"/>
-          </p:cNvSpPr>
-          <p:nvPr>
-            <p:ph idx="1"/>
-          </p:nvPr>
-        </p:nvSpPr>
-        <p:spPr>
-          <a:xfrm>
-            <a:off x="838200" y="1825625"/>
-            <a:ext cx="6811682" cy="3257125"/>
-          </a:xfrm>
-        </p:spPr>
-        <p:txBody>
-          <a:bodyPr>
-            <a:normAutofit/>
-          </a:bodyPr>
-          <a:lstStyle/>
-          <a:p>
-            <a:r>
-              <a:rPr lang="en-US" b="1" dirty="0"/>
-              <a:t>Global Scope</a:t>
-            </a:r>
-          </a:p>
-        </p:txBody>
-      </p:sp>
-      <p:sp>
-        <p:nvSpPr>
           <p:cNvPr id="16" name="TextBox 15">
             <a:extLst>
               <a:ext uri="{FF2B5EF4-FFF2-40B4-BE49-F238E27FC236}">
@@ -7248,6 +7805,41 @@
       </p:sp>
       <p:sp>
         <p:nvSpPr>
+          <p:cNvPr id="14" name="Content Placeholder 2">
+            <a:extLst>
+              <a:ext uri="{FF2B5EF4-FFF2-40B4-BE49-F238E27FC236}">
+                <a16:creationId xmlns:a16="http://schemas.microsoft.com/office/drawing/2014/main" id="{41A55381-03D0-4DB3-A1E2-922A8A625420}"/>
+              </a:ext>
+            </a:extLst>
+          </p:cNvPr>
+          <p:cNvSpPr>
+            <a:spLocks noGrp="1"/>
+          </p:cNvSpPr>
+          <p:nvPr>
+            <p:ph idx="1"/>
+          </p:nvPr>
+        </p:nvSpPr>
+        <p:spPr>
+          <a:xfrm>
+            <a:off x="838200" y="1825625"/>
+            <a:ext cx="6811682" cy="3257125"/>
+          </a:xfrm>
+        </p:spPr>
+        <p:txBody>
+          <a:bodyPr>
+            <a:normAutofit/>
+          </a:bodyPr>
+          <a:lstStyle/>
+          <a:p>
+            <a:r>
+              <a:rPr lang="en-US" b="1" dirty="0"/>
+              <a:t>Global Scope</a:t>
+            </a:r>
+          </a:p>
+        </p:txBody>
+      </p:sp>
+      <p:sp>
+        <p:nvSpPr>
           <p:cNvPr id="7" name="TextBox 6">
             <a:extLst>
               <a:ext uri="{FF2B5EF4-FFF2-40B4-BE49-F238E27FC236}">
@@ -7597,41 +8189,6 @@
       </p:sp>
       <p:sp>
         <p:nvSpPr>
-          <p:cNvPr id="14" name="Content Placeholder 2">
-            <a:extLst>
-              <a:ext uri="{FF2B5EF4-FFF2-40B4-BE49-F238E27FC236}">
-                <a16:creationId xmlns:a16="http://schemas.microsoft.com/office/drawing/2014/main" id="{41A55381-03D0-4DB3-A1E2-922A8A625420}"/>
-              </a:ext>
-            </a:extLst>
-          </p:cNvPr>
-          <p:cNvSpPr>
-            <a:spLocks noGrp="1"/>
-          </p:cNvSpPr>
-          <p:nvPr>
-            <p:ph idx="1"/>
-          </p:nvPr>
-        </p:nvSpPr>
-        <p:spPr>
-          <a:xfrm>
-            <a:off x="838200" y="1825625"/>
-            <a:ext cx="6811682" cy="3257125"/>
-          </a:xfrm>
-        </p:spPr>
-        <p:txBody>
-          <a:bodyPr>
-            <a:normAutofit/>
-          </a:bodyPr>
-          <a:lstStyle/>
-          <a:p>
-            <a:r>
-              <a:rPr lang="en-US" b="1" dirty="0"/>
-              <a:t>Global Scope</a:t>
-            </a:r>
-          </a:p>
-        </p:txBody>
-      </p:sp>
-      <p:sp>
-        <p:nvSpPr>
           <p:cNvPr id="16" name="TextBox 15">
             <a:extLst>
               <a:ext uri="{FF2B5EF4-FFF2-40B4-BE49-F238E27FC236}">
@@ -7869,6 +8426,41 @@
       </p:sp>
       <p:sp>
         <p:nvSpPr>
+          <p:cNvPr id="14" name="Content Placeholder 2">
+            <a:extLst>
+              <a:ext uri="{FF2B5EF4-FFF2-40B4-BE49-F238E27FC236}">
+                <a16:creationId xmlns:a16="http://schemas.microsoft.com/office/drawing/2014/main" id="{41A55381-03D0-4DB3-A1E2-922A8A625420}"/>
+              </a:ext>
+            </a:extLst>
+          </p:cNvPr>
+          <p:cNvSpPr>
+            <a:spLocks noGrp="1"/>
+          </p:cNvSpPr>
+          <p:nvPr>
+            <p:ph idx="1"/>
+          </p:nvPr>
+        </p:nvSpPr>
+        <p:spPr>
+          <a:xfrm>
+            <a:off x="838200" y="1825625"/>
+            <a:ext cx="6811682" cy="3257125"/>
+          </a:xfrm>
+        </p:spPr>
+        <p:txBody>
+          <a:bodyPr>
+            <a:normAutofit/>
+          </a:bodyPr>
+          <a:lstStyle/>
+          <a:p>
+            <a:r>
+              <a:rPr lang="en-US" b="1" dirty="0"/>
+              <a:t>Global Scope</a:t>
+            </a:r>
+          </a:p>
+        </p:txBody>
+      </p:sp>
+      <p:sp>
+        <p:nvSpPr>
           <p:cNvPr id="9" name="Rectangle: Rounded Corners 8">
             <a:extLst>
               <a:ext uri="{FF2B5EF4-FFF2-40B4-BE49-F238E27FC236}">
@@ -8001,41 +8593,6 @@
       </p:sp>
       <p:sp>
         <p:nvSpPr>
-          <p:cNvPr id="14" name="Content Placeholder 2">
-            <a:extLst>
-              <a:ext uri="{FF2B5EF4-FFF2-40B4-BE49-F238E27FC236}">
-                <a16:creationId xmlns:a16="http://schemas.microsoft.com/office/drawing/2014/main" id="{41A55381-03D0-4DB3-A1E2-922A8A625420}"/>
-              </a:ext>
-            </a:extLst>
-          </p:cNvPr>
-          <p:cNvSpPr>
-            <a:spLocks noGrp="1"/>
-          </p:cNvSpPr>
-          <p:nvPr>
-            <p:ph idx="1"/>
-          </p:nvPr>
-        </p:nvSpPr>
-        <p:spPr>
-          <a:xfrm>
-            <a:off x="838200" y="1825625"/>
-            <a:ext cx="6811682" cy="3257125"/>
-          </a:xfrm>
-        </p:spPr>
-        <p:txBody>
-          <a:bodyPr>
-            <a:normAutofit/>
-          </a:bodyPr>
-          <a:lstStyle/>
-          <a:p>
-            <a:r>
-              <a:rPr lang="en-US" b="1" dirty="0"/>
-              <a:t>Global Scope</a:t>
-            </a:r>
-          </a:p>
-        </p:txBody>
-      </p:sp>
-      <p:sp>
-        <p:nvSpPr>
           <p:cNvPr id="15" name="TextBox 14">
             <a:extLst>
               <a:ext uri="{FF2B5EF4-FFF2-40B4-BE49-F238E27FC236}">
@@ -8197,6 +8754,41 @@
             <a:r>
               <a:rPr lang="en-US" b="1" dirty="0"/>
               <a:t>Variable Scope</a:t>
+            </a:r>
+          </a:p>
+        </p:txBody>
+      </p:sp>
+      <p:sp>
+        <p:nvSpPr>
+          <p:cNvPr id="14" name="Content Placeholder 2">
+            <a:extLst>
+              <a:ext uri="{FF2B5EF4-FFF2-40B4-BE49-F238E27FC236}">
+                <a16:creationId xmlns:a16="http://schemas.microsoft.com/office/drawing/2014/main" id="{41A55381-03D0-4DB3-A1E2-922A8A625420}"/>
+              </a:ext>
+            </a:extLst>
+          </p:cNvPr>
+          <p:cNvSpPr>
+            <a:spLocks noGrp="1"/>
+          </p:cNvSpPr>
+          <p:nvPr>
+            <p:ph idx="1"/>
+          </p:nvPr>
+        </p:nvSpPr>
+        <p:spPr>
+          <a:xfrm>
+            <a:off x="838200" y="1825625"/>
+            <a:ext cx="6811682" cy="3257125"/>
+          </a:xfrm>
+        </p:spPr>
+        <p:txBody>
+          <a:bodyPr>
+            <a:normAutofit/>
+          </a:bodyPr>
+          <a:lstStyle/>
+          <a:p>
+            <a:r>
+              <a:rPr lang="en-US" b="1" dirty="0"/>
+              <a:t>Global Scope</a:t>
             </a:r>
           </a:p>
         </p:txBody>
@@ -8335,41 +8927,6 @@
       </p:sp>
       <p:sp>
         <p:nvSpPr>
-          <p:cNvPr id="14" name="Content Placeholder 2">
-            <a:extLst>
-              <a:ext uri="{FF2B5EF4-FFF2-40B4-BE49-F238E27FC236}">
-                <a16:creationId xmlns:a16="http://schemas.microsoft.com/office/drawing/2014/main" id="{41A55381-03D0-4DB3-A1E2-922A8A625420}"/>
-              </a:ext>
-            </a:extLst>
-          </p:cNvPr>
-          <p:cNvSpPr>
-            <a:spLocks noGrp="1"/>
-          </p:cNvSpPr>
-          <p:nvPr>
-            <p:ph idx="1"/>
-          </p:nvPr>
-        </p:nvSpPr>
-        <p:spPr>
-          <a:xfrm>
-            <a:off x="838200" y="1825625"/>
-            <a:ext cx="6811682" cy="3257125"/>
-          </a:xfrm>
-        </p:spPr>
-        <p:txBody>
-          <a:bodyPr>
-            <a:normAutofit/>
-          </a:bodyPr>
-          <a:lstStyle/>
-          <a:p>
-            <a:r>
-              <a:rPr lang="en-US" b="1" dirty="0"/>
-              <a:t>Global Scope</a:t>
-            </a:r>
-          </a:p>
-        </p:txBody>
-      </p:sp>
-      <p:sp>
-        <p:nvSpPr>
           <p:cNvPr id="15" name="TextBox 14">
             <a:extLst>
               <a:ext uri="{FF2B5EF4-FFF2-40B4-BE49-F238E27FC236}">
@@ -8629,6 +9186,41 @@
             <a:r>
               <a:rPr lang="en-US" b="1" dirty="0"/>
               <a:t>Variable Scope</a:t>
+            </a:r>
+          </a:p>
+        </p:txBody>
+      </p:sp>
+      <p:sp>
+        <p:nvSpPr>
+          <p:cNvPr id="14" name="Content Placeholder 2">
+            <a:extLst>
+              <a:ext uri="{FF2B5EF4-FFF2-40B4-BE49-F238E27FC236}">
+                <a16:creationId xmlns:a16="http://schemas.microsoft.com/office/drawing/2014/main" id="{41A55381-03D0-4DB3-A1E2-922A8A625420}"/>
+              </a:ext>
+            </a:extLst>
+          </p:cNvPr>
+          <p:cNvSpPr>
+            <a:spLocks noGrp="1"/>
+          </p:cNvSpPr>
+          <p:nvPr>
+            <p:ph idx="1"/>
+          </p:nvPr>
+        </p:nvSpPr>
+        <p:spPr>
+          <a:xfrm>
+            <a:off x="838200" y="1825625"/>
+            <a:ext cx="6811682" cy="3257125"/>
+          </a:xfrm>
+        </p:spPr>
+        <p:txBody>
+          <a:bodyPr>
+            <a:normAutofit/>
+          </a:bodyPr>
+          <a:lstStyle/>
+          <a:p>
+            <a:r>
+              <a:rPr lang="en-US" b="1" dirty="0"/>
+              <a:t>Global Scope</a:t>
             </a:r>
           </a:p>
         </p:txBody>
@@ -8767,41 +9359,6 @@
       </p:sp>
       <p:sp>
         <p:nvSpPr>
-          <p:cNvPr id="14" name="Content Placeholder 2">
-            <a:extLst>
-              <a:ext uri="{FF2B5EF4-FFF2-40B4-BE49-F238E27FC236}">
-                <a16:creationId xmlns:a16="http://schemas.microsoft.com/office/drawing/2014/main" id="{41A55381-03D0-4DB3-A1E2-922A8A625420}"/>
-              </a:ext>
-            </a:extLst>
-          </p:cNvPr>
-          <p:cNvSpPr>
-            <a:spLocks noGrp="1"/>
-          </p:cNvSpPr>
-          <p:nvPr>
-            <p:ph idx="1"/>
-          </p:nvPr>
-        </p:nvSpPr>
-        <p:spPr>
-          <a:xfrm>
-            <a:off x="838200" y="1825625"/>
-            <a:ext cx="6811682" cy="3257125"/>
-          </a:xfrm>
-        </p:spPr>
-        <p:txBody>
-          <a:bodyPr>
-            <a:normAutofit/>
-          </a:bodyPr>
-          <a:lstStyle/>
-          <a:p>
-            <a:r>
-              <a:rPr lang="en-US" b="1" dirty="0"/>
-              <a:t>Global Scope</a:t>
-            </a:r>
-          </a:p>
-        </p:txBody>
-      </p:sp>
-      <p:sp>
-        <p:nvSpPr>
           <p:cNvPr id="15" name="TextBox 14">
             <a:extLst>
               <a:ext uri="{FF2B5EF4-FFF2-40B4-BE49-F238E27FC236}">
@@ -9042,6 +9599,41 @@
       </p:sp>
       <p:sp>
         <p:nvSpPr>
+          <p:cNvPr id="14" name="Content Placeholder 2">
+            <a:extLst>
+              <a:ext uri="{FF2B5EF4-FFF2-40B4-BE49-F238E27FC236}">
+                <a16:creationId xmlns:a16="http://schemas.microsoft.com/office/drawing/2014/main" id="{41A55381-03D0-4DB3-A1E2-922A8A625420}"/>
+              </a:ext>
+            </a:extLst>
+          </p:cNvPr>
+          <p:cNvSpPr>
+            <a:spLocks noGrp="1"/>
+          </p:cNvSpPr>
+          <p:nvPr>
+            <p:ph idx="1"/>
+          </p:nvPr>
+        </p:nvSpPr>
+        <p:spPr>
+          <a:xfrm>
+            <a:off x="838200" y="1825625"/>
+            <a:ext cx="6811682" cy="3257125"/>
+          </a:xfrm>
+        </p:spPr>
+        <p:txBody>
+          <a:bodyPr>
+            <a:normAutofit/>
+          </a:bodyPr>
+          <a:lstStyle/>
+          <a:p>
+            <a:r>
+              <a:rPr lang="en-US" b="1" dirty="0"/>
+              <a:t>Global Scope</a:t>
+            </a:r>
+          </a:p>
+        </p:txBody>
+      </p:sp>
+      <p:sp>
+        <p:nvSpPr>
           <p:cNvPr id="9" name="Rectangle: Rounded Corners 8">
             <a:extLst>
               <a:ext uri="{FF2B5EF4-FFF2-40B4-BE49-F238E27FC236}">
@@ -9174,41 +9766,6 @@
       </p:sp>
       <p:sp>
         <p:nvSpPr>
-          <p:cNvPr id="14" name="Content Placeholder 2">
-            <a:extLst>
-              <a:ext uri="{FF2B5EF4-FFF2-40B4-BE49-F238E27FC236}">
-                <a16:creationId xmlns:a16="http://schemas.microsoft.com/office/drawing/2014/main" id="{41A55381-03D0-4DB3-A1E2-922A8A625420}"/>
-              </a:ext>
-            </a:extLst>
-          </p:cNvPr>
-          <p:cNvSpPr>
-            <a:spLocks noGrp="1"/>
-          </p:cNvSpPr>
-          <p:nvPr>
-            <p:ph idx="1"/>
-          </p:nvPr>
-        </p:nvSpPr>
-        <p:spPr>
-          <a:xfrm>
-            <a:off x="838200" y="1825625"/>
-            <a:ext cx="6811682" cy="3257125"/>
-          </a:xfrm>
-        </p:spPr>
-        <p:txBody>
-          <a:bodyPr>
-            <a:normAutofit/>
-          </a:bodyPr>
-          <a:lstStyle/>
-          <a:p>
-            <a:r>
-              <a:rPr lang="en-US" b="1" dirty="0"/>
-              <a:t>Global Scope</a:t>
-            </a:r>
-          </a:p>
-        </p:txBody>
-      </p:sp>
-      <p:sp>
-        <p:nvSpPr>
           <p:cNvPr id="15" name="TextBox 14">
             <a:extLst>
               <a:ext uri="{FF2B5EF4-FFF2-40B4-BE49-F238E27FC236}">
@@ -9449,6 +10006,41 @@
       </p:sp>
       <p:sp>
         <p:nvSpPr>
+          <p:cNvPr id="14" name="Content Placeholder 2">
+            <a:extLst>
+              <a:ext uri="{FF2B5EF4-FFF2-40B4-BE49-F238E27FC236}">
+                <a16:creationId xmlns:a16="http://schemas.microsoft.com/office/drawing/2014/main" id="{41A55381-03D0-4DB3-A1E2-922A8A625420}"/>
+              </a:ext>
+            </a:extLst>
+          </p:cNvPr>
+          <p:cNvSpPr>
+            <a:spLocks noGrp="1"/>
+          </p:cNvSpPr>
+          <p:nvPr>
+            <p:ph idx="1"/>
+          </p:nvPr>
+        </p:nvSpPr>
+        <p:spPr>
+          <a:xfrm>
+            <a:off x="838200" y="1825625"/>
+            <a:ext cx="6811682" cy="3257125"/>
+          </a:xfrm>
+        </p:spPr>
+        <p:txBody>
+          <a:bodyPr>
+            <a:normAutofit/>
+          </a:bodyPr>
+          <a:lstStyle/>
+          <a:p>
+            <a:r>
+              <a:rPr lang="en-US" b="1" dirty="0"/>
+              <a:t>Global Scope</a:t>
+            </a:r>
+          </a:p>
+        </p:txBody>
+      </p:sp>
+      <p:sp>
+        <p:nvSpPr>
           <p:cNvPr id="7" name="TextBox 6">
             <a:extLst>
               <a:ext uri="{FF2B5EF4-FFF2-40B4-BE49-F238E27FC236}">
@@ -9752,41 +10344,6 @@
       </p:sp>
       <p:sp>
         <p:nvSpPr>
-          <p:cNvPr id="14" name="Content Placeholder 2">
-            <a:extLst>
-              <a:ext uri="{FF2B5EF4-FFF2-40B4-BE49-F238E27FC236}">
-                <a16:creationId xmlns:a16="http://schemas.microsoft.com/office/drawing/2014/main" id="{41A55381-03D0-4DB3-A1E2-922A8A625420}"/>
-              </a:ext>
-            </a:extLst>
-          </p:cNvPr>
-          <p:cNvSpPr>
-            <a:spLocks noGrp="1"/>
-          </p:cNvSpPr>
-          <p:nvPr>
-            <p:ph idx="1"/>
-          </p:nvPr>
-        </p:nvSpPr>
-        <p:spPr>
-          <a:xfrm>
-            <a:off x="838200" y="1825625"/>
-            <a:ext cx="6811682" cy="3257125"/>
-          </a:xfrm>
-        </p:spPr>
-        <p:txBody>
-          <a:bodyPr>
-            <a:normAutofit/>
-          </a:bodyPr>
-          <a:lstStyle/>
-          <a:p>
-            <a:r>
-              <a:rPr lang="en-US" b="1" dirty="0"/>
-              <a:t>Global Scope</a:t>
-            </a:r>
-          </a:p>
-        </p:txBody>
-      </p:sp>
-      <p:sp>
-        <p:nvSpPr>
           <p:cNvPr id="15" name="TextBox 14">
             <a:extLst>
               <a:ext uri="{FF2B5EF4-FFF2-40B4-BE49-F238E27FC236}">
@@ -10027,6 +10584,41 @@
       </p:sp>
       <p:sp>
         <p:nvSpPr>
+          <p:cNvPr id="14" name="Content Placeholder 2">
+            <a:extLst>
+              <a:ext uri="{FF2B5EF4-FFF2-40B4-BE49-F238E27FC236}">
+                <a16:creationId xmlns:a16="http://schemas.microsoft.com/office/drawing/2014/main" id="{41A55381-03D0-4DB3-A1E2-922A8A625420}"/>
+              </a:ext>
+            </a:extLst>
+          </p:cNvPr>
+          <p:cNvSpPr>
+            <a:spLocks noGrp="1"/>
+          </p:cNvSpPr>
+          <p:nvPr>
+            <p:ph idx="1"/>
+          </p:nvPr>
+        </p:nvSpPr>
+        <p:spPr>
+          <a:xfrm>
+            <a:off x="838200" y="1825625"/>
+            <a:ext cx="6811682" cy="3257125"/>
+          </a:xfrm>
+        </p:spPr>
+        <p:txBody>
+          <a:bodyPr>
+            <a:normAutofit/>
+          </a:bodyPr>
+          <a:lstStyle/>
+          <a:p>
+            <a:r>
+              <a:rPr lang="en-US" b="1" dirty="0"/>
+              <a:t>Global Scope</a:t>
+            </a:r>
+          </a:p>
+        </p:txBody>
+      </p:sp>
+      <p:sp>
+        <p:nvSpPr>
           <p:cNvPr id="9" name="Rectangle: Rounded Corners 8">
             <a:extLst>
               <a:ext uri="{FF2B5EF4-FFF2-40B4-BE49-F238E27FC236}">
@@ -10154,41 +10746,6 @@
               <a:t>my_function</a:t>
             </a:r>
             <a:endParaRPr lang="en-US" dirty="0"/>
-          </a:p>
-        </p:txBody>
-      </p:sp>
-      <p:sp>
-        <p:nvSpPr>
-          <p:cNvPr id="14" name="Content Placeholder 2">
-            <a:extLst>
-              <a:ext uri="{FF2B5EF4-FFF2-40B4-BE49-F238E27FC236}">
-                <a16:creationId xmlns:a16="http://schemas.microsoft.com/office/drawing/2014/main" id="{41A55381-03D0-4DB3-A1E2-922A8A625420}"/>
-              </a:ext>
-            </a:extLst>
-          </p:cNvPr>
-          <p:cNvSpPr>
-            <a:spLocks noGrp="1"/>
-          </p:cNvSpPr>
-          <p:nvPr>
-            <p:ph idx="1"/>
-          </p:nvPr>
-        </p:nvSpPr>
-        <p:spPr>
-          <a:xfrm>
-            <a:off x="838200" y="1825625"/>
-            <a:ext cx="6811682" cy="3257125"/>
-          </a:xfrm>
-        </p:spPr>
-        <p:txBody>
-          <a:bodyPr>
-            <a:normAutofit/>
-          </a:bodyPr>
-          <a:lstStyle/>
-          <a:p>
-            <a:r>
-              <a:rPr lang="en-US" b="1" dirty="0"/>
-              <a:t>Global Scope</a:t>
-            </a:r>
           </a:p>
         </p:txBody>
       </p:sp>
@@ -10590,6 +11147,41 @@
       </p:sp>
       <p:sp>
         <p:nvSpPr>
+          <p:cNvPr id="14" name="Content Placeholder 2">
+            <a:extLst>
+              <a:ext uri="{FF2B5EF4-FFF2-40B4-BE49-F238E27FC236}">
+                <a16:creationId xmlns:a16="http://schemas.microsoft.com/office/drawing/2014/main" id="{41A55381-03D0-4DB3-A1E2-922A8A625420}"/>
+              </a:ext>
+            </a:extLst>
+          </p:cNvPr>
+          <p:cNvSpPr>
+            <a:spLocks noGrp="1"/>
+          </p:cNvSpPr>
+          <p:nvPr>
+            <p:ph idx="1"/>
+          </p:nvPr>
+        </p:nvSpPr>
+        <p:spPr>
+          <a:xfrm>
+            <a:off x="838200" y="1825625"/>
+            <a:ext cx="6811682" cy="3257125"/>
+          </a:xfrm>
+        </p:spPr>
+        <p:txBody>
+          <a:bodyPr>
+            <a:normAutofit/>
+          </a:bodyPr>
+          <a:lstStyle/>
+          <a:p>
+            <a:r>
+              <a:rPr lang="en-US" b="1" dirty="0"/>
+              <a:t>Global Scope</a:t>
+            </a:r>
+          </a:p>
+        </p:txBody>
+      </p:sp>
+      <p:sp>
+        <p:nvSpPr>
           <p:cNvPr id="9" name="Rectangle: Rounded Corners 8">
             <a:extLst>
               <a:ext uri="{FF2B5EF4-FFF2-40B4-BE49-F238E27FC236}">
@@ -10722,41 +11314,6 @@
       </p:sp>
       <p:sp>
         <p:nvSpPr>
-          <p:cNvPr id="14" name="Content Placeholder 2">
-            <a:extLst>
-              <a:ext uri="{FF2B5EF4-FFF2-40B4-BE49-F238E27FC236}">
-                <a16:creationId xmlns:a16="http://schemas.microsoft.com/office/drawing/2014/main" id="{41A55381-03D0-4DB3-A1E2-922A8A625420}"/>
-              </a:ext>
-            </a:extLst>
-          </p:cNvPr>
-          <p:cNvSpPr>
-            <a:spLocks noGrp="1"/>
-          </p:cNvSpPr>
-          <p:nvPr>
-            <p:ph idx="1"/>
-          </p:nvPr>
-        </p:nvSpPr>
-        <p:spPr>
-          <a:xfrm>
-            <a:off x="838200" y="1825625"/>
-            <a:ext cx="6811682" cy="3257125"/>
-          </a:xfrm>
-        </p:spPr>
-        <p:txBody>
-          <a:bodyPr>
-            <a:normAutofit/>
-          </a:bodyPr>
-          <a:lstStyle/>
-          <a:p>
-            <a:r>
-              <a:rPr lang="en-US" b="1" dirty="0"/>
-              <a:t>Global Scope</a:t>
-            </a:r>
-          </a:p>
-        </p:txBody>
-      </p:sp>
-      <p:sp>
-        <p:nvSpPr>
           <p:cNvPr id="15" name="TextBox 14">
             <a:extLst>
               <a:ext uri="{FF2B5EF4-FFF2-40B4-BE49-F238E27FC236}">
@@ -10986,6 +11543,41 @@
             <a:r>
               <a:rPr lang="en-US" b="1" dirty="0"/>
               <a:t>Variable Scope</a:t>
+            </a:r>
+          </a:p>
+        </p:txBody>
+      </p:sp>
+      <p:sp>
+        <p:nvSpPr>
+          <p:cNvPr id="14" name="Content Placeholder 2">
+            <a:extLst>
+              <a:ext uri="{FF2B5EF4-FFF2-40B4-BE49-F238E27FC236}">
+                <a16:creationId xmlns:a16="http://schemas.microsoft.com/office/drawing/2014/main" id="{41A55381-03D0-4DB3-A1E2-922A8A625420}"/>
+              </a:ext>
+            </a:extLst>
+          </p:cNvPr>
+          <p:cNvSpPr>
+            <a:spLocks noGrp="1"/>
+          </p:cNvSpPr>
+          <p:nvPr>
+            <p:ph idx="1"/>
+          </p:nvPr>
+        </p:nvSpPr>
+        <p:spPr>
+          <a:xfrm>
+            <a:off x="838200" y="1825625"/>
+            <a:ext cx="6811682" cy="3257125"/>
+          </a:xfrm>
+        </p:spPr>
+        <p:txBody>
+          <a:bodyPr>
+            <a:normAutofit/>
+          </a:bodyPr>
+          <a:lstStyle/>
+          <a:p>
+            <a:r>
+              <a:rPr lang="en-US" b="1" dirty="0"/>
+              <a:t>Global Scope</a:t>
             </a:r>
           </a:p>
         </p:txBody>
@@ -11124,41 +11716,6 @@
       </p:sp>
       <p:sp>
         <p:nvSpPr>
-          <p:cNvPr id="14" name="Content Placeholder 2">
-            <a:extLst>
-              <a:ext uri="{FF2B5EF4-FFF2-40B4-BE49-F238E27FC236}">
-                <a16:creationId xmlns:a16="http://schemas.microsoft.com/office/drawing/2014/main" id="{41A55381-03D0-4DB3-A1E2-922A8A625420}"/>
-              </a:ext>
-            </a:extLst>
-          </p:cNvPr>
-          <p:cNvSpPr>
-            <a:spLocks noGrp="1"/>
-          </p:cNvSpPr>
-          <p:nvPr>
-            <p:ph idx="1"/>
-          </p:nvPr>
-        </p:nvSpPr>
-        <p:spPr>
-          <a:xfrm>
-            <a:off x="838200" y="1825625"/>
-            <a:ext cx="6811682" cy="3257125"/>
-          </a:xfrm>
-        </p:spPr>
-        <p:txBody>
-          <a:bodyPr>
-            <a:normAutofit/>
-          </a:bodyPr>
-          <a:lstStyle/>
-          <a:p>
-            <a:r>
-              <a:rPr lang="en-US" b="1" dirty="0"/>
-              <a:t>Global Scope</a:t>
-            </a:r>
-          </a:p>
-        </p:txBody>
-      </p:sp>
-      <p:sp>
-        <p:nvSpPr>
           <p:cNvPr id="15" name="TextBox 14">
             <a:extLst>
               <a:ext uri="{FF2B5EF4-FFF2-40B4-BE49-F238E27FC236}">
@@ -11385,6 +11942,41 @@
       </p:sp>
       <p:sp>
         <p:nvSpPr>
+          <p:cNvPr id="14" name="Content Placeholder 2">
+            <a:extLst>
+              <a:ext uri="{FF2B5EF4-FFF2-40B4-BE49-F238E27FC236}">
+                <a16:creationId xmlns:a16="http://schemas.microsoft.com/office/drawing/2014/main" id="{41A55381-03D0-4DB3-A1E2-922A8A625420}"/>
+              </a:ext>
+            </a:extLst>
+          </p:cNvPr>
+          <p:cNvSpPr>
+            <a:spLocks noGrp="1"/>
+          </p:cNvSpPr>
+          <p:nvPr>
+            <p:ph idx="1"/>
+          </p:nvPr>
+        </p:nvSpPr>
+        <p:spPr>
+          <a:xfrm>
+            <a:off x="838200" y="1825625"/>
+            <a:ext cx="6811682" cy="3257125"/>
+          </a:xfrm>
+        </p:spPr>
+        <p:txBody>
+          <a:bodyPr>
+            <a:normAutofit/>
+          </a:bodyPr>
+          <a:lstStyle/>
+          <a:p>
+            <a:r>
+              <a:rPr lang="en-US" b="1" dirty="0"/>
+              <a:t>Global Scope</a:t>
+            </a:r>
+          </a:p>
+        </p:txBody>
+      </p:sp>
+      <p:sp>
+        <p:nvSpPr>
           <p:cNvPr id="9" name="Rectangle: Rounded Corners 8">
             <a:extLst>
               <a:ext uri="{FF2B5EF4-FFF2-40B4-BE49-F238E27FC236}">
@@ -11517,41 +12109,6 @@
       </p:sp>
       <p:sp>
         <p:nvSpPr>
-          <p:cNvPr id="14" name="Content Placeholder 2">
-            <a:extLst>
-              <a:ext uri="{FF2B5EF4-FFF2-40B4-BE49-F238E27FC236}">
-                <a16:creationId xmlns:a16="http://schemas.microsoft.com/office/drawing/2014/main" id="{41A55381-03D0-4DB3-A1E2-922A8A625420}"/>
-              </a:ext>
-            </a:extLst>
-          </p:cNvPr>
-          <p:cNvSpPr>
-            <a:spLocks noGrp="1"/>
-          </p:cNvSpPr>
-          <p:nvPr>
-            <p:ph idx="1"/>
-          </p:nvPr>
-        </p:nvSpPr>
-        <p:spPr>
-          <a:xfrm>
-            <a:off x="838200" y="1825625"/>
-            <a:ext cx="6811682" cy="3257125"/>
-          </a:xfrm>
-        </p:spPr>
-        <p:txBody>
-          <a:bodyPr>
-            <a:normAutofit/>
-          </a:bodyPr>
-          <a:lstStyle/>
-          <a:p>
-            <a:r>
-              <a:rPr lang="en-US" b="1" dirty="0"/>
-              <a:t>Global Scope</a:t>
-            </a:r>
-          </a:p>
-        </p:txBody>
-      </p:sp>
-      <p:sp>
-        <p:nvSpPr>
           <p:cNvPr id="15" name="TextBox 14">
             <a:extLst>
               <a:ext uri="{FF2B5EF4-FFF2-40B4-BE49-F238E27FC236}">
@@ -12650,12 +13207,7 @@
             <p:ph idx="1"/>
           </p:nvPr>
         </p:nvSpPr>
-        <p:spPr>
-          <a:xfrm>
-            <a:off x="838200" y="1825624"/>
-            <a:ext cx="10515600" cy="4835479"/>
-          </a:xfrm>
-        </p:spPr>
+        <p:spPr/>
         <p:txBody>
           <a:bodyPr>
             <a:normAutofit/>
@@ -19728,6 +20280,425 @@
       </p:sp>
       <p:sp>
         <p:nvSpPr>
+          <p:cNvPr id="20" name="Content Placeholder 2">
+            <a:extLst>
+              <a:ext uri="{FF2B5EF4-FFF2-40B4-BE49-F238E27FC236}">
+                <a16:creationId xmlns:a16="http://schemas.microsoft.com/office/drawing/2014/main" id="{2C093C5F-CE5F-4416-9C1B-7E0D243D37DC}"/>
+              </a:ext>
+            </a:extLst>
+          </p:cNvPr>
+          <p:cNvSpPr>
+            <a:spLocks noGrp="1"/>
+          </p:cNvSpPr>
+          <p:nvPr>
+            <p:ph idx="1"/>
+          </p:nvPr>
+        </p:nvSpPr>
+        <p:spPr>
+          <a:xfrm>
+            <a:off x="838199" y="1825624"/>
+            <a:ext cx="10724535" cy="4835479"/>
+          </a:xfrm>
+        </p:spPr>
+        <p:txBody>
+          <a:bodyPr>
+            <a:normAutofit fontScale="92500" lnSpcReduction="10000"/>
+          </a:bodyPr>
+          <a:lstStyle/>
+          <a:p>
+            <a:r>
+              <a:rPr lang="en-US" b="1" dirty="0">
+                <a:solidFill>
+                  <a:srgbClr val="00FF00"/>
+                </a:solidFill>
+                <a:latin typeface="Courier New" panose="02070309020205020404" pitchFamily="49" charset="0"/>
+                <a:cs typeface="Courier New" panose="02070309020205020404" pitchFamily="49" charset="0"/>
+              </a:rPr>
+              <a:t>def</a:t>
+            </a:r>
+            <a:r>
+              <a:rPr lang="en-US" dirty="0"/>
+              <a:t> </a:t>
+            </a:r>
+            <a:r>
+              <a:rPr lang="en-US" dirty="0">
+                <a:solidFill>
+                  <a:schemeClr val="accent2"/>
+                </a:solidFill>
+              </a:rPr>
+              <a:t>-</a:t>
+            </a:r>
+            <a:r>
+              <a:rPr lang="en-US" dirty="0"/>
+              <a:t> is a keyword, standing for </a:t>
+            </a:r>
+            <a:r>
+              <a:rPr lang="en-US" dirty="0">
+                <a:solidFill>
+                  <a:schemeClr val="accent6"/>
+                </a:solidFill>
+              </a:rPr>
+              <a:t>"</a:t>
+            </a:r>
+            <a:r>
+              <a:rPr lang="en-US" dirty="0"/>
+              <a:t>definition</a:t>
+            </a:r>
+            <a:r>
+              <a:rPr lang="en-US" dirty="0">
+                <a:solidFill>
+                  <a:schemeClr val="accent6"/>
+                </a:solidFill>
+              </a:rPr>
+              <a:t>"</a:t>
+            </a:r>
+            <a:r>
+              <a:rPr lang="en-US" dirty="0">
+                <a:solidFill>
+                  <a:schemeClr val="accent2"/>
+                </a:solidFill>
+              </a:rPr>
+              <a:t>.</a:t>
+            </a:r>
+            <a:r>
+              <a:rPr lang="en-US" dirty="0"/>
+              <a:t> All function definitions must begin with </a:t>
+            </a:r>
+            <a:r>
+              <a:rPr lang="en-US" b="1" dirty="0">
+                <a:solidFill>
+                  <a:srgbClr val="00FF00"/>
+                </a:solidFill>
+                <a:latin typeface="Courier New" panose="02070309020205020404" pitchFamily="49" charset="0"/>
+                <a:cs typeface="Courier New" panose="02070309020205020404" pitchFamily="49" charset="0"/>
+              </a:rPr>
+              <a:t>def</a:t>
+            </a:r>
+            <a:r>
+              <a:rPr lang="en-US" dirty="0">
+                <a:solidFill>
+                  <a:schemeClr val="accent1"/>
+                </a:solidFill>
+              </a:rPr>
+              <a:t>.</a:t>
+            </a:r>
+            <a:r>
+              <a:rPr lang="en-US" dirty="0"/>
+              <a:t> The </a:t>
+            </a:r>
+            <a:r>
+              <a:rPr lang="en-US" b="1" dirty="0">
+                <a:solidFill>
+                  <a:srgbClr val="00FF00"/>
+                </a:solidFill>
+                <a:latin typeface="Courier New" panose="02070309020205020404" pitchFamily="49" charset="0"/>
+                <a:cs typeface="Courier New" panose="02070309020205020404" pitchFamily="49" charset="0"/>
+              </a:rPr>
+              <a:t>def</a:t>
+            </a:r>
+            <a:r>
+              <a:rPr lang="en-US" dirty="0"/>
+              <a:t> statement must end with a colon</a:t>
+            </a:r>
+            <a:r>
+              <a:rPr lang="en-US" dirty="0">
+                <a:solidFill>
+                  <a:schemeClr val="accent1"/>
+                </a:solidFill>
+              </a:rPr>
+              <a:t>.</a:t>
+            </a:r>
+          </a:p>
+          <a:p>
+            <a:r>
+              <a:rPr lang="en-US" b="1" dirty="0">
+                <a:solidFill>
+                  <a:srgbClr val="00FF00"/>
+                </a:solidFill>
+                <a:latin typeface="Courier New" panose="02070309020205020404" pitchFamily="49" charset="0"/>
+                <a:cs typeface="Courier New" panose="02070309020205020404" pitchFamily="49" charset="0"/>
+              </a:rPr>
+              <a:t>function_name</a:t>
+            </a:r>
+            <a:r>
+              <a:rPr lang="en-US" dirty="0"/>
+              <a:t> </a:t>
+            </a:r>
+            <a:r>
+              <a:rPr lang="en-US" dirty="0">
+                <a:solidFill>
+                  <a:schemeClr val="accent2"/>
+                </a:solidFill>
+              </a:rPr>
+              <a:t>- </a:t>
+            </a:r>
+            <a:r>
+              <a:rPr lang="en-US" dirty="0"/>
+              <a:t>is the name you will use to call the function </a:t>
+            </a:r>
+            <a:r>
+              <a:rPr lang="en-US" dirty="0">
+                <a:solidFill>
+                  <a:schemeClr val="accent6"/>
+                </a:solidFill>
+              </a:rPr>
+              <a:t>(</a:t>
+            </a:r>
+            <a:r>
+              <a:rPr lang="en-US" dirty="0"/>
+              <a:t>like sin, abs but you need to create your own name</a:t>
+            </a:r>
+            <a:r>
+              <a:rPr lang="en-US" dirty="0">
+                <a:solidFill>
+                  <a:schemeClr val="accent6"/>
+                </a:solidFill>
+              </a:rPr>
+              <a:t>)</a:t>
+            </a:r>
+            <a:r>
+              <a:rPr lang="en-US" dirty="0">
+                <a:solidFill>
+                  <a:schemeClr val="accent2"/>
+                </a:solidFill>
+              </a:rPr>
+              <a:t>.</a:t>
+            </a:r>
+          </a:p>
+          <a:p>
+            <a:r>
+              <a:rPr lang="en-US" b="1" dirty="0">
+                <a:solidFill>
+                  <a:srgbClr val="00FF00"/>
+                </a:solidFill>
+                <a:latin typeface="Courier New" panose="02070309020205020404" pitchFamily="49" charset="0"/>
+                <a:cs typeface="Courier New" panose="02070309020205020404" pitchFamily="49" charset="0"/>
+              </a:rPr>
+              <a:t>parameters</a:t>
+            </a:r>
+            <a:r>
+              <a:rPr lang="en-US" dirty="0"/>
+              <a:t> </a:t>
+            </a:r>
+            <a:r>
+              <a:rPr lang="en-US" dirty="0">
+                <a:solidFill>
+                  <a:schemeClr val="accent2"/>
+                </a:solidFill>
+              </a:rPr>
+              <a:t>-</a:t>
+            </a:r>
+            <a:r>
+              <a:rPr lang="en-US" dirty="0"/>
+              <a:t> are the variables that get values when you call the function</a:t>
+            </a:r>
+            <a:r>
+              <a:rPr lang="en-US" dirty="0">
+                <a:solidFill>
+                  <a:schemeClr val="accent1"/>
+                </a:solidFill>
+              </a:rPr>
+              <a:t>.</a:t>
+            </a:r>
+            <a:r>
+              <a:rPr lang="en-US" dirty="0"/>
+              <a:t> You can have 0 or more parameters</a:t>
+            </a:r>
+            <a:r>
+              <a:rPr lang="en-US" dirty="0">
+                <a:solidFill>
+                  <a:schemeClr val="accent2"/>
+                </a:solidFill>
+              </a:rPr>
+              <a:t>,</a:t>
+            </a:r>
+            <a:r>
+              <a:rPr lang="en-US" dirty="0"/>
+              <a:t> separated by commas</a:t>
+            </a:r>
+            <a:r>
+              <a:rPr lang="en-US" dirty="0">
+                <a:solidFill>
+                  <a:schemeClr val="accent2"/>
+                </a:solidFill>
+              </a:rPr>
+              <a:t>.</a:t>
+            </a:r>
+            <a:r>
+              <a:rPr lang="en-US" dirty="0"/>
+              <a:t> Must be in parenthesis</a:t>
+            </a:r>
+            <a:r>
+              <a:rPr lang="en-US" dirty="0">
+                <a:solidFill>
+                  <a:schemeClr val="accent2"/>
+                </a:solidFill>
+              </a:rPr>
+              <a:t>.</a:t>
+            </a:r>
+          </a:p>
+          <a:p>
+            <a:r>
+              <a:rPr lang="en-US" b="1" dirty="0">
+                <a:solidFill>
+                  <a:srgbClr val="00FF00"/>
+                </a:solidFill>
+                <a:latin typeface="Courier New" panose="02070309020205020404" pitchFamily="49" charset="0"/>
+                <a:cs typeface="Courier New" panose="02070309020205020404" pitchFamily="49" charset="0"/>
+              </a:rPr>
+              <a:t>body</a:t>
+            </a:r>
+            <a:r>
+              <a:rPr lang="en-US" dirty="0"/>
+              <a:t> </a:t>
+            </a:r>
+            <a:r>
+              <a:rPr lang="en-US" dirty="0">
+                <a:solidFill>
+                  <a:schemeClr val="accent2"/>
+                </a:solidFill>
+              </a:rPr>
+              <a:t>-</a:t>
+            </a:r>
+            <a:r>
+              <a:rPr lang="en-US" dirty="0"/>
+              <a:t> body is a sequence of commands like we've already seen </a:t>
+            </a:r>
+            <a:r>
+              <a:rPr lang="en-US" dirty="0">
+                <a:solidFill>
+                  <a:schemeClr val="accent6"/>
+                </a:solidFill>
+              </a:rPr>
+              <a:t>(</a:t>
+            </a:r>
+            <a:r>
+              <a:rPr lang="en-US" dirty="0"/>
+              <a:t>assignment</a:t>
+            </a:r>
+            <a:r>
+              <a:rPr lang="en-US" dirty="0">
+                <a:solidFill>
+                  <a:schemeClr val="accent1"/>
+                </a:solidFill>
+              </a:rPr>
+              <a:t>,</a:t>
+            </a:r>
+            <a:r>
+              <a:rPr lang="en-US" dirty="0"/>
+              <a:t> multiplication</a:t>
+            </a:r>
+            <a:r>
+              <a:rPr lang="en-US" dirty="0">
+                <a:solidFill>
+                  <a:schemeClr val="accent1"/>
+                </a:solidFill>
+              </a:rPr>
+              <a:t>,</a:t>
+            </a:r>
+            <a:r>
+              <a:rPr lang="en-US" dirty="0"/>
+              <a:t> function calls</a:t>
+            </a:r>
+            <a:r>
+              <a:rPr lang="en-US" dirty="0">
+                <a:solidFill>
+                  <a:schemeClr val="accent6"/>
+                </a:solidFill>
+              </a:rPr>
+              <a:t>)</a:t>
+            </a:r>
+            <a:r>
+              <a:rPr lang="en-US" dirty="0">
+                <a:solidFill>
+                  <a:schemeClr val="accent2"/>
+                </a:solidFill>
+              </a:rPr>
+              <a:t>.</a:t>
+            </a:r>
+          </a:p>
+          <a:p>
+            <a:r>
+              <a:rPr lang="en-US" b="1" dirty="0">
+                <a:solidFill>
+                  <a:srgbClr val="00FF00"/>
+                </a:solidFill>
+                <a:latin typeface="Courier New" panose="02070309020205020404" pitchFamily="49" charset="0"/>
+                <a:cs typeface="Courier New" panose="02070309020205020404" pitchFamily="49" charset="0"/>
+              </a:rPr>
+              <a:t>return</a:t>
+            </a:r>
+            <a:r>
+              <a:rPr lang="en-US" dirty="0"/>
+              <a:t> </a:t>
+            </a:r>
+            <a:r>
+              <a:rPr lang="en-US" dirty="0">
+                <a:solidFill>
+                  <a:schemeClr val="accent2"/>
+                </a:solidFill>
+              </a:rPr>
+              <a:t>–</a:t>
+            </a:r>
+            <a:r>
+              <a:rPr lang="en-US" dirty="0"/>
+              <a:t> ends the function and returns data (like the sine of an angle</a:t>
+            </a:r>
+            <a:r>
+              <a:rPr lang="en-US" dirty="0">
+                <a:solidFill>
+                  <a:schemeClr val="accent2"/>
+                </a:solidFill>
+              </a:rPr>
+              <a:t>.</a:t>
+            </a:r>
+          </a:p>
+          <a:p>
+            <a:r>
+              <a:rPr lang="en-US" dirty="0">
+                <a:solidFill>
+                  <a:schemeClr val="accent6"/>
+                </a:solidFill>
+              </a:rPr>
+              <a:t>Important</a:t>
+            </a:r>
+            <a:r>
+              <a:rPr lang="en-US" dirty="0">
+                <a:solidFill>
+                  <a:schemeClr val="accent2"/>
+                </a:solidFill>
+              </a:rPr>
+              <a:t>:</a:t>
+            </a:r>
+            <a:r>
+              <a:rPr lang="en-US" dirty="0"/>
+              <a:t> all the lines of body must be indented</a:t>
+            </a:r>
+            <a:r>
+              <a:rPr lang="en-US" dirty="0">
+                <a:solidFill>
+                  <a:schemeClr val="accent2"/>
+                </a:solidFill>
+              </a:rPr>
+              <a:t>.</a:t>
+            </a:r>
+            <a:r>
+              <a:rPr lang="en-US" dirty="0"/>
+              <a:t> That is how Python knows that they are part of the function</a:t>
+            </a:r>
+            <a:r>
+              <a:rPr lang="en-US" dirty="0">
+                <a:solidFill>
+                  <a:schemeClr val="accent2"/>
+                </a:solidFill>
+              </a:rPr>
+              <a:t>.</a:t>
+            </a:r>
+          </a:p>
+        </p:txBody>
+      </p:sp>
+      <p:sp>
+        <p:nvSpPr>
           <p:cNvPr id="6" name="TextBox 5">
             <a:extLst>
               <a:ext uri="{FF2B5EF4-FFF2-40B4-BE49-F238E27FC236}">
@@ -19787,425 +20758,6 @@
                 <a:cs typeface="Courier New" panose="02070309020205020404" pitchFamily="49" charset="0"/>
               </a:rPr>
               <a:t>    return</a:t>
-            </a:r>
-          </a:p>
-        </p:txBody>
-      </p:sp>
-      <p:sp>
-        <p:nvSpPr>
-          <p:cNvPr id="20" name="Content Placeholder 2">
-            <a:extLst>
-              <a:ext uri="{FF2B5EF4-FFF2-40B4-BE49-F238E27FC236}">
-                <a16:creationId xmlns:a16="http://schemas.microsoft.com/office/drawing/2014/main" id="{2C093C5F-CE5F-4416-9C1B-7E0D243D37DC}"/>
-              </a:ext>
-            </a:extLst>
-          </p:cNvPr>
-          <p:cNvSpPr>
-            <a:spLocks noGrp="1"/>
-          </p:cNvSpPr>
-          <p:nvPr>
-            <p:ph idx="1"/>
-          </p:nvPr>
-        </p:nvSpPr>
-        <p:spPr>
-          <a:xfrm>
-            <a:off x="838199" y="1825624"/>
-            <a:ext cx="10724535" cy="4835479"/>
-          </a:xfrm>
-        </p:spPr>
-        <p:txBody>
-          <a:bodyPr>
-            <a:normAutofit fontScale="92500" lnSpcReduction="10000"/>
-          </a:bodyPr>
-          <a:lstStyle/>
-          <a:p>
-            <a:r>
-              <a:rPr lang="en-US" b="1" dirty="0">
-                <a:solidFill>
-                  <a:srgbClr val="00FF00"/>
-                </a:solidFill>
-                <a:latin typeface="Courier New" panose="02070309020205020404" pitchFamily="49" charset="0"/>
-                <a:cs typeface="Courier New" panose="02070309020205020404" pitchFamily="49" charset="0"/>
-              </a:rPr>
-              <a:t>def</a:t>
-            </a:r>
-            <a:r>
-              <a:rPr lang="en-US" dirty="0"/>
-              <a:t> </a:t>
-            </a:r>
-            <a:r>
-              <a:rPr lang="en-US" dirty="0">
-                <a:solidFill>
-                  <a:schemeClr val="accent2"/>
-                </a:solidFill>
-              </a:rPr>
-              <a:t>-</a:t>
-            </a:r>
-            <a:r>
-              <a:rPr lang="en-US" dirty="0"/>
-              <a:t> is a keyword, standing for </a:t>
-            </a:r>
-            <a:r>
-              <a:rPr lang="en-US" dirty="0">
-                <a:solidFill>
-                  <a:schemeClr val="accent6"/>
-                </a:solidFill>
-              </a:rPr>
-              <a:t>"</a:t>
-            </a:r>
-            <a:r>
-              <a:rPr lang="en-US" dirty="0"/>
-              <a:t>definition</a:t>
-            </a:r>
-            <a:r>
-              <a:rPr lang="en-US" dirty="0">
-                <a:solidFill>
-                  <a:schemeClr val="accent6"/>
-                </a:solidFill>
-              </a:rPr>
-              <a:t>"</a:t>
-            </a:r>
-            <a:r>
-              <a:rPr lang="en-US" dirty="0">
-                <a:solidFill>
-                  <a:schemeClr val="accent2"/>
-                </a:solidFill>
-              </a:rPr>
-              <a:t>.</a:t>
-            </a:r>
-            <a:r>
-              <a:rPr lang="en-US" dirty="0"/>
-              <a:t> All function definitions must begin with </a:t>
-            </a:r>
-            <a:r>
-              <a:rPr lang="en-US" b="1" dirty="0">
-                <a:solidFill>
-                  <a:srgbClr val="00FF00"/>
-                </a:solidFill>
-                <a:latin typeface="Courier New" panose="02070309020205020404" pitchFamily="49" charset="0"/>
-                <a:cs typeface="Courier New" panose="02070309020205020404" pitchFamily="49" charset="0"/>
-              </a:rPr>
-              <a:t>def</a:t>
-            </a:r>
-            <a:r>
-              <a:rPr lang="en-US" dirty="0">
-                <a:solidFill>
-                  <a:schemeClr val="accent1"/>
-                </a:solidFill>
-              </a:rPr>
-              <a:t>.</a:t>
-            </a:r>
-            <a:r>
-              <a:rPr lang="en-US" dirty="0"/>
-              <a:t> The </a:t>
-            </a:r>
-            <a:r>
-              <a:rPr lang="en-US" b="1" dirty="0">
-                <a:solidFill>
-                  <a:srgbClr val="00FF00"/>
-                </a:solidFill>
-                <a:latin typeface="Courier New" panose="02070309020205020404" pitchFamily="49" charset="0"/>
-                <a:cs typeface="Courier New" panose="02070309020205020404" pitchFamily="49" charset="0"/>
-              </a:rPr>
-              <a:t>def</a:t>
-            </a:r>
-            <a:r>
-              <a:rPr lang="en-US" dirty="0"/>
-              <a:t> statement must end with a colon</a:t>
-            </a:r>
-            <a:r>
-              <a:rPr lang="en-US" dirty="0">
-                <a:solidFill>
-                  <a:schemeClr val="accent1"/>
-                </a:solidFill>
-              </a:rPr>
-              <a:t>.</a:t>
-            </a:r>
-          </a:p>
-          <a:p>
-            <a:r>
-              <a:rPr lang="en-US" b="1" dirty="0">
-                <a:solidFill>
-                  <a:srgbClr val="00FF00"/>
-                </a:solidFill>
-                <a:latin typeface="Courier New" panose="02070309020205020404" pitchFamily="49" charset="0"/>
-                <a:cs typeface="Courier New" panose="02070309020205020404" pitchFamily="49" charset="0"/>
-              </a:rPr>
-              <a:t>function_name</a:t>
-            </a:r>
-            <a:r>
-              <a:rPr lang="en-US" dirty="0"/>
-              <a:t> </a:t>
-            </a:r>
-            <a:r>
-              <a:rPr lang="en-US" dirty="0">
-                <a:solidFill>
-                  <a:schemeClr val="accent2"/>
-                </a:solidFill>
-              </a:rPr>
-              <a:t>- </a:t>
-            </a:r>
-            <a:r>
-              <a:rPr lang="en-US" dirty="0"/>
-              <a:t>is the name you will use to call the function </a:t>
-            </a:r>
-            <a:r>
-              <a:rPr lang="en-US" dirty="0">
-                <a:solidFill>
-                  <a:schemeClr val="accent6"/>
-                </a:solidFill>
-              </a:rPr>
-              <a:t>(</a:t>
-            </a:r>
-            <a:r>
-              <a:rPr lang="en-US" dirty="0"/>
-              <a:t>like sin, abs but you need to create your own name</a:t>
-            </a:r>
-            <a:r>
-              <a:rPr lang="en-US" dirty="0">
-                <a:solidFill>
-                  <a:schemeClr val="accent6"/>
-                </a:solidFill>
-              </a:rPr>
-              <a:t>)</a:t>
-            </a:r>
-            <a:r>
-              <a:rPr lang="en-US" dirty="0">
-                <a:solidFill>
-                  <a:schemeClr val="accent2"/>
-                </a:solidFill>
-              </a:rPr>
-              <a:t>.</a:t>
-            </a:r>
-          </a:p>
-          <a:p>
-            <a:r>
-              <a:rPr lang="en-US" b="1" dirty="0">
-                <a:solidFill>
-                  <a:srgbClr val="00FF00"/>
-                </a:solidFill>
-                <a:latin typeface="Courier New" panose="02070309020205020404" pitchFamily="49" charset="0"/>
-                <a:cs typeface="Courier New" panose="02070309020205020404" pitchFamily="49" charset="0"/>
-              </a:rPr>
-              <a:t>parameters</a:t>
-            </a:r>
-            <a:r>
-              <a:rPr lang="en-US" dirty="0"/>
-              <a:t> </a:t>
-            </a:r>
-            <a:r>
-              <a:rPr lang="en-US" dirty="0">
-                <a:solidFill>
-                  <a:schemeClr val="accent2"/>
-                </a:solidFill>
-              </a:rPr>
-              <a:t>-</a:t>
-            </a:r>
-            <a:r>
-              <a:rPr lang="en-US" dirty="0"/>
-              <a:t> are the variables that get values when you call the function</a:t>
-            </a:r>
-            <a:r>
-              <a:rPr lang="en-US" dirty="0">
-                <a:solidFill>
-                  <a:schemeClr val="accent1"/>
-                </a:solidFill>
-              </a:rPr>
-              <a:t>.</a:t>
-            </a:r>
-            <a:r>
-              <a:rPr lang="en-US" dirty="0"/>
-              <a:t> You can have 0 or more parameters</a:t>
-            </a:r>
-            <a:r>
-              <a:rPr lang="en-US" dirty="0">
-                <a:solidFill>
-                  <a:schemeClr val="accent2"/>
-                </a:solidFill>
-              </a:rPr>
-              <a:t>,</a:t>
-            </a:r>
-            <a:r>
-              <a:rPr lang="en-US" dirty="0"/>
-              <a:t> separated by commas</a:t>
-            </a:r>
-            <a:r>
-              <a:rPr lang="en-US" dirty="0">
-                <a:solidFill>
-                  <a:schemeClr val="accent2"/>
-                </a:solidFill>
-              </a:rPr>
-              <a:t>.</a:t>
-            </a:r>
-            <a:r>
-              <a:rPr lang="en-US" dirty="0"/>
-              <a:t> Must be in parenthesis</a:t>
-            </a:r>
-            <a:r>
-              <a:rPr lang="en-US" dirty="0">
-                <a:solidFill>
-                  <a:schemeClr val="accent2"/>
-                </a:solidFill>
-              </a:rPr>
-              <a:t>.</a:t>
-            </a:r>
-          </a:p>
-          <a:p>
-            <a:r>
-              <a:rPr lang="en-US" b="1" dirty="0">
-                <a:solidFill>
-                  <a:srgbClr val="00FF00"/>
-                </a:solidFill>
-                <a:latin typeface="Courier New" panose="02070309020205020404" pitchFamily="49" charset="0"/>
-                <a:cs typeface="Courier New" panose="02070309020205020404" pitchFamily="49" charset="0"/>
-              </a:rPr>
-              <a:t>body</a:t>
-            </a:r>
-            <a:r>
-              <a:rPr lang="en-US" dirty="0"/>
-              <a:t> </a:t>
-            </a:r>
-            <a:r>
-              <a:rPr lang="en-US" dirty="0">
-                <a:solidFill>
-                  <a:schemeClr val="accent2"/>
-                </a:solidFill>
-              </a:rPr>
-              <a:t>-</a:t>
-            </a:r>
-            <a:r>
-              <a:rPr lang="en-US" dirty="0"/>
-              <a:t> body is a sequence of commands like we've already seen </a:t>
-            </a:r>
-            <a:r>
-              <a:rPr lang="en-US" dirty="0">
-                <a:solidFill>
-                  <a:schemeClr val="accent6"/>
-                </a:solidFill>
-              </a:rPr>
-              <a:t>(</a:t>
-            </a:r>
-            <a:r>
-              <a:rPr lang="en-US" dirty="0"/>
-              <a:t>assignment</a:t>
-            </a:r>
-            <a:r>
-              <a:rPr lang="en-US" dirty="0">
-                <a:solidFill>
-                  <a:schemeClr val="accent1"/>
-                </a:solidFill>
-              </a:rPr>
-              <a:t>,</a:t>
-            </a:r>
-            <a:r>
-              <a:rPr lang="en-US" dirty="0"/>
-              <a:t> multiplication</a:t>
-            </a:r>
-            <a:r>
-              <a:rPr lang="en-US" dirty="0">
-                <a:solidFill>
-                  <a:schemeClr val="accent1"/>
-                </a:solidFill>
-              </a:rPr>
-              <a:t>,</a:t>
-            </a:r>
-            <a:r>
-              <a:rPr lang="en-US" dirty="0"/>
-              <a:t> function calls</a:t>
-            </a:r>
-            <a:r>
-              <a:rPr lang="en-US" dirty="0">
-                <a:solidFill>
-                  <a:schemeClr val="accent6"/>
-                </a:solidFill>
-              </a:rPr>
-              <a:t>)</a:t>
-            </a:r>
-            <a:r>
-              <a:rPr lang="en-US" dirty="0">
-                <a:solidFill>
-                  <a:schemeClr val="accent2"/>
-                </a:solidFill>
-              </a:rPr>
-              <a:t>.</a:t>
-            </a:r>
-          </a:p>
-          <a:p>
-            <a:r>
-              <a:rPr lang="en-US" b="1" dirty="0">
-                <a:solidFill>
-                  <a:srgbClr val="00FF00"/>
-                </a:solidFill>
-                <a:latin typeface="Courier New" panose="02070309020205020404" pitchFamily="49" charset="0"/>
-                <a:cs typeface="Courier New" panose="02070309020205020404" pitchFamily="49" charset="0"/>
-              </a:rPr>
-              <a:t>return</a:t>
-            </a:r>
-            <a:r>
-              <a:rPr lang="en-US" dirty="0"/>
-              <a:t> </a:t>
-            </a:r>
-            <a:r>
-              <a:rPr lang="en-US" dirty="0">
-                <a:solidFill>
-                  <a:schemeClr val="accent2"/>
-                </a:solidFill>
-              </a:rPr>
-              <a:t>–</a:t>
-            </a:r>
-            <a:r>
-              <a:rPr lang="en-US" dirty="0"/>
-              <a:t> ends the function and returns data (like the sine of an angle</a:t>
-            </a:r>
-            <a:r>
-              <a:rPr lang="en-US" dirty="0">
-                <a:solidFill>
-                  <a:schemeClr val="accent2"/>
-                </a:solidFill>
-              </a:rPr>
-              <a:t>.</a:t>
-            </a:r>
-          </a:p>
-          <a:p>
-            <a:r>
-              <a:rPr lang="en-US" dirty="0">
-                <a:solidFill>
-                  <a:schemeClr val="accent6"/>
-                </a:solidFill>
-              </a:rPr>
-              <a:t>Important</a:t>
-            </a:r>
-            <a:r>
-              <a:rPr lang="en-US" dirty="0">
-                <a:solidFill>
-                  <a:schemeClr val="accent2"/>
-                </a:solidFill>
-              </a:rPr>
-              <a:t>:</a:t>
-            </a:r>
-            <a:r>
-              <a:rPr lang="en-US" dirty="0"/>
-              <a:t> all the lines of body must be indented</a:t>
-            </a:r>
-            <a:r>
-              <a:rPr lang="en-US" dirty="0">
-                <a:solidFill>
-                  <a:schemeClr val="accent2"/>
-                </a:solidFill>
-              </a:rPr>
-              <a:t>.</a:t>
-            </a:r>
-            <a:r>
-              <a:rPr lang="en-US" dirty="0"/>
-              <a:t> That is how Python knows that they are part of the function</a:t>
-            </a:r>
-            <a:r>
-              <a:rPr lang="en-US" dirty="0">
-                <a:solidFill>
-                  <a:schemeClr val="accent2"/>
-                </a:solidFill>
-              </a:rPr>
-              <a:t>.</a:t>
             </a:r>
           </a:p>
         </p:txBody>
@@ -20283,6 +20835,73 @@
       </p:sp>
       <p:sp>
         <p:nvSpPr>
+          <p:cNvPr id="6" name="Content Placeholder 2">
+            <a:extLst>
+              <a:ext uri="{FF2B5EF4-FFF2-40B4-BE49-F238E27FC236}">
+                <a16:creationId xmlns:a16="http://schemas.microsoft.com/office/drawing/2014/main" id="{3B398CEB-BD84-3604-465A-CED66E3E9666}"/>
+              </a:ext>
+            </a:extLst>
+          </p:cNvPr>
+          <p:cNvSpPr>
+            <a:spLocks noGrp="1"/>
+          </p:cNvSpPr>
+          <p:nvPr>
+            <p:ph idx="1"/>
+          </p:nvPr>
+        </p:nvSpPr>
+        <p:spPr>
+          <a:xfrm>
+            <a:off x="924169" y="1731840"/>
+            <a:ext cx="4757615" cy="4835479"/>
+          </a:xfrm>
+        </p:spPr>
+        <p:txBody>
+          <a:bodyPr>
+            <a:normAutofit/>
+          </a:bodyPr>
+          <a:lstStyle/>
+          <a:p>
+            <a:r>
+              <a:rPr lang="en-US" sz="3200" b="1" dirty="0">
+                <a:solidFill>
+                  <a:schemeClr val="accent6"/>
+                </a:solidFill>
+              </a:rPr>
+              <a:t>Use cases</a:t>
+            </a:r>
+          </a:p>
+          <a:p>
+            <a:r>
+              <a:rPr lang="en-US" sz="3200" dirty="0"/>
+              <a:t>Debugging</a:t>
+            </a:r>
+            <a:r>
+              <a:rPr lang="en-US" sz="3200" dirty="0">
+                <a:solidFill>
+                  <a:schemeClr val="accent1"/>
+                </a:solidFill>
+              </a:rPr>
+              <a:t>.</a:t>
+            </a:r>
+          </a:p>
+          <a:p>
+            <a:r>
+              <a:rPr lang="en-US" sz="3200" dirty="0"/>
+              <a:t>Displaying messages to users</a:t>
+            </a:r>
+            <a:r>
+              <a:rPr lang="en-US" sz="3200" dirty="0">
+                <a:solidFill>
+                  <a:schemeClr val="accent1"/>
+                </a:solidFill>
+              </a:rPr>
+              <a:t>.</a:t>
+            </a:r>
+          </a:p>
+        </p:txBody>
+      </p:sp>
+      <p:sp>
+        <p:nvSpPr>
           <p:cNvPr id="3" name="Title 3">
             <a:extLst>
               <a:ext uri="{FF2B5EF4-FFF2-40B4-BE49-F238E27FC236}">
@@ -20337,73 +20956,6 @@
                 <a:cs typeface="Courier New" panose="02070309020205020404" pitchFamily="49" charset="0"/>
               </a:rPr>
               <a:t>return</a:t>
-            </a:r>
-          </a:p>
-        </p:txBody>
-      </p:sp>
-      <p:sp>
-        <p:nvSpPr>
-          <p:cNvPr id="6" name="Content Placeholder 2">
-            <a:extLst>
-              <a:ext uri="{FF2B5EF4-FFF2-40B4-BE49-F238E27FC236}">
-                <a16:creationId xmlns:a16="http://schemas.microsoft.com/office/drawing/2014/main" id="{3B398CEB-BD84-3604-465A-CED66E3E9666}"/>
-              </a:ext>
-            </a:extLst>
-          </p:cNvPr>
-          <p:cNvSpPr>
-            <a:spLocks noGrp="1"/>
-          </p:cNvSpPr>
-          <p:nvPr>
-            <p:ph idx="1"/>
-          </p:nvPr>
-        </p:nvSpPr>
-        <p:spPr>
-          <a:xfrm>
-            <a:off x="924169" y="1731840"/>
-            <a:ext cx="4757615" cy="4835479"/>
-          </a:xfrm>
-        </p:spPr>
-        <p:txBody>
-          <a:bodyPr>
-            <a:normAutofit/>
-          </a:bodyPr>
-          <a:lstStyle/>
-          <a:p>
-            <a:r>
-              <a:rPr lang="en-US" sz="3200" b="1" dirty="0">
-                <a:solidFill>
-                  <a:schemeClr val="accent6"/>
-                </a:solidFill>
-              </a:rPr>
-              <a:t>Use cases</a:t>
-            </a:r>
-          </a:p>
-          <a:p>
-            <a:r>
-              <a:rPr lang="en-US" sz="3200" dirty="0"/>
-              <a:t>Debugging</a:t>
-            </a:r>
-            <a:r>
-              <a:rPr lang="en-US" sz="3200" dirty="0">
-                <a:solidFill>
-                  <a:schemeClr val="accent1"/>
-                </a:solidFill>
-              </a:rPr>
-              <a:t>.</a:t>
-            </a:r>
-          </a:p>
-          <a:p>
-            <a:r>
-              <a:rPr lang="en-US" sz="3200" dirty="0"/>
-              <a:t>Displaying messages to users</a:t>
-            </a:r>
-            <a:r>
-              <a:rPr lang="en-US" sz="3200" dirty="0">
-                <a:solidFill>
-                  <a:schemeClr val="accent1"/>
-                </a:solidFill>
-              </a:rPr>
-              <a:t>.</a:t>
             </a:r>
           </a:p>
         </p:txBody>
@@ -24447,12 +24999,7 @@
             <p:ph idx="1"/>
           </p:nvPr>
         </p:nvSpPr>
-        <p:spPr>
-          <a:xfrm>
-            <a:off x="838200" y="1825624"/>
-            <a:ext cx="10515600" cy="4835479"/>
-          </a:xfrm>
-        </p:spPr>
+        <p:spPr/>
         <p:txBody>
           <a:bodyPr>
             <a:normAutofit/>
@@ -26411,12 +26958,7 @@
             <p:ph type="title"/>
           </p:nvPr>
         </p:nvSpPr>
-        <p:spPr>
-          <a:xfrm>
-            <a:off x="838200" y="727514"/>
-            <a:ext cx="10515600" cy="656148"/>
-          </a:xfrm>
-        </p:spPr>
+        <p:spPr/>
         <p:txBody>
           <a:bodyPr>
             <a:normAutofit fontScale="90000"/>
@@ -28564,9 +29106,9 @@
 </file>
 
 <file path=ppt/theme/theme1.xml><?xml version="1.0" encoding="utf-8"?>
-<a:theme xmlns:a="http://schemas.openxmlformats.org/drawingml/2006/main" name="APS106_PPTX_Theme">
+<a:theme xmlns:a="http://schemas.openxmlformats.org/drawingml/2006/main" name="APS106_Theme">
   <a:themeElements>
-    <a:clrScheme name="Custom 5">
+    <a:clrScheme name="Custom 2">
       <a:dk1>
         <a:srgbClr val="444445"/>
       </a:dk1>
@@ -28580,13 +29122,13 @@
         <a:srgbClr val="3D464D"/>
       </a:lt2>
       <a:accent1>
-        <a:srgbClr val="017EE5"/>
+        <a:srgbClr val="0061FF"/>
       </a:accent1>
       <a:accent2>
-        <a:srgbClr val="017EE5"/>
+        <a:srgbClr val="0061FF"/>
       </a:accent2>
       <a:accent3>
-        <a:srgbClr val="017EE5"/>
+        <a:srgbClr val="0061FF"/>
       </a:accent3>
       <a:accent4>
         <a:srgbClr val="7B8994"/>
@@ -28595,7 +29137,7 @@
         <a:srgbClr val="7B8994"/>
       </a:accent5>
       <a:accent6>
-        <a:srgbClr val="FF9933"/>
+        <a:srgbClr val="F7B41A"/>
       </a:accent6>
       <a:hlink>
         <a:srgbClr val="3D464D"/>
@@ -28758,7 +29300,7 @@
   <a:extraClrSchemeLst/>
   <a:extLst>
     <a:ext uri="{05A4C25C-085E-4340-85A3-A5531E510DB2}">
-      <thm15:themeFamily xmlns:thm15="http://schemas.microsoft.com/office/thememl/2012/main" name="APS106_PPTX_Theme" id="{D71ABBE9-7E6D-4E30-BD8F-2EB61EB32A2D}" vid="{056030BA-02C6-4208-ACCE-F1B550CC0AA4}"/>
+      <thm15:themeFamily xmlns:thm15="http://schemas.microsoft.com/office/thememl/2012/main" name="APS106_Theme" id="{3BEEB87C-8A6C-443F-995D-4A4893CCEBD8}" vid="{9B7A7CDB-8752-4A8C-8C1A-92E8A921146E}"/>
     </a:ext>
   </a:extLst>
 </a:theme>

</xml_diff>